<commit_message>
feat: added to ppt
</commit_message>
<xml_diff>
--- a/Tim-Sort-Presentation.pptx
+++ b/Tim-Sort-Presentation.pptx
@@ -118,6 +118,11 @@
       </a:defRPr>
     </a:lvl9pPr>
   </p:defaultTextStyle>
+  <p:extLst>
+    <p:ext uri="{EFAFB233-063F-42B5-8137-9DF3F51BA10A}">
+      <p15:sldGuideLst xmlns:p15="http://schemas.microsoft.com/office/powerpoint/2012/main"/>
+    </p:ext>
+  </p:extLst>
 </p:presentation>
 </file>
 
@@ -859,7 +864,7 @@
           <a:p>
             <a:fld id="{19155D95-533A-4703-ABCE-33892A3F63FF}" type="datetimeFigureOut">
               <a:rPr lang="en-US" smtClean="0"/>
-              <a:t>4/4/2024</a:t>
+              <a:t>4/9/2024</a:t>
             </a:fld>
             <a:endParaRPr lang="en-US"/>
           </a:p>
@@ -1103,7 +1108,7 @@
           <a:p>
             <a:fld id="{19155D95-533A-4703-ABCE-33892A3F63FF}" type="datetimeFigureOut">
               <a:rPr lang="en-US" smtClean="0"/>
-              <a:t>4/4/2024</a:t>
+              <a:t>4/9/2024</a:t>
             </a:fld>
             <a:endParaRPr lang="en-US"/>
           </a:p>
@@ -1311,7 +1316,7 @@
           <a:p>
             <a:fld id="{19155D95-533A-4703-ABCE-33892A3F63FF}" type="datetimeFigureOut">
               <a:rPr lang="en-US" smtClean="0"/>
-              <a:t>4/4/2024</a:t>
+              <a:t>4/9/2024</a:t>
             </a:fld>
             <a:endParaRPr lang="en-US"/>
           </a:p>
@@ -1509,7 +1514,7 @@
           <a:p>
             <a:fld id="{19155D95-533A-4703-ABCE-33892A3F63FF}" type="datetimeFigureOut">
               <a:rPr lang="en-US" smtClean="0"/>
-              <a:t>4/4/2024</a:t>
+              <a:t>4/9/2024</a:t>
             </a:fld>
             <a:endParaRPr lang="en-US"/>
           </a:p>
@@ -1804,7 +1809,7 @@
           <a:p>
             <a:fld id="{19155D95-533A-4703-ABCE-33892A3F63FF}" type="datetimeFigureOut">
               <a:rPr lang="en-US" smtClean="0"/>
-              <a:t>4/4/2024</a:t>
+              <a:t>4/9/2024</a:t>
             </a:fld>
             <a:endParaRPr lang="en-US"/>
           </a:p>
@@ -2178,7 +2183,7 @@
           <a:p>
             <a:fld id="{19155D95-533A-4703-ABCE-33892A3F63FF}" type="datetimeFigureOut">
               <a:rPr lang="en-US" smtClean="0"/>
-              <a:t>4/4/2024</a:t>
+              <a:t>4/9/2024</a:t>
             </a:fld>
             <a:endParaRPr lang="en-US"/>
           </a:p>
@@ -2590,7 +2595,7 @@
           <a:p>
             <a:fld id="{19155D95-533A-4703-ABCE-33892A3F63FF}" type="datetimeFigureOut">
               <a:rPr lang="en-US" smtClean="0"/>
-              <a:t>4/4/2024</a:t>
+              <a:t>4/9/2024</a:t>
             </a:fld>
             <a:endParaRPr lang="en-US"/>
           </a:p>
@@ -2731,7 +2736,7 @@
           <a:p>
             <a:fld id="{19155D95-533A-4703-ABCE-33892A3F63FF}" type="datetimeFigureOut">
               <a:rPr lang="en-US" smtClean="0"/>
-              <a:t>4/4/2024</a:t>
+              <a:t>4/9/2024</a:t>
             </a:fld>
             <a:endParaRPr lang="en-US"/>
           </a:p>
@@ -2844,7 +2849,7 @@
           <a:p>
             <a:fld id="{19155D95-533A-4703-ABCE-33892A3F63FF}" type="datetimeFigureOut">
               <a:rPr lang="en-US" smtClean="0"/>
-              <a:t>4/4/2024</a:t>
+              <a:t>4/9/2024</a:t>
             </a:fld>
             <a:endParaRPr lang="en-US"/>
           </a:p>
@@ -3155,7 +3160,7 @@
           <a:p>
             <a:fld id="{19155D95-533A-4703-ABCE-33892A3F63FF}" type="datetimeFigureOut">
               <a:rPr lang="en-US" smtClean="0"/>
-              <a:t>4/4/2024</a:t>
+              <a:t>4/9/2024</a:t>
             </a:fld>
             <a:endParaRPr lang="en-US"/>
           </a:p>
@@ -3488,7 +3493,7 @@
           <a:p>
             <a:fld id="{19155D95-533A-4703-ABCE-33892A3F63FF}" type="datetimeFigureOut">
               <a:rPr lang="en-US" smtClean="0"/>
-              <a:t>4/4/2024</a:t>
+              <a:t>4/9/2024</a:t>
             </a:fld>
             <a:endParaRPr lang="en-US"/>
           </a:p>
@@ -3811,7 +3816,7 @@
             <a:fld id="{19155D95-533A-4703-ABCE-33892A3F63FF}" type="datetimeFigureOut">
               <a:rPr lang="en-US" smtClean="0"/>
               <a:pPr/>
-              <a:t>4/4/2024</a:t>
+              <a:t>4/9/2024</a:t>
             </a:fld>
             <a:endParaRPr lang="en-US"/>
           </a:p>
@@ -4777,35 +4782,1555 @@
         </p:nvSpPr>
         <p:spPr/>
         <p:txBody>
-          <a:bodyPr/>
-          <a:lstStyle/>
-          <a:p>
-            <a:endParaRPr lang="en-US"/>
-          </a:p>
-        </p:txBody>
-      </p:sp>
-      <p:sp>
-        <p:nvSpPr>
-          <p:cNvPr id="5" name="Content Placeholder 4">
-            <a:extLst>
-              <a:ext uri="{FF2B5EF4-FFF2-40B4-BE49-F238E27FC236}">
-                <a16:creationId xmlns:a16="http://schemas.microsoft.com/office/drawing/2014/main" id="{582B29E0-1EE9-4F46-925C-2766D92FB555}"/>
-              </a:ext>
-            </a:extLst>
-          </p:cNvPr>
-          <p:cNvSpPr>
-            <a:spLocks noGrp="1"/>
-          </p:cNvSpPr>
+          <a:bodyPr>
+            <a:normAutofit/>
+          </a:bodyPr>
+          <a:lstStyle/>
+          <a:p>
+            <a:r>
+              <a:rPr lang="en-US" sz="3600" dirty="0"/>
+              <a:t>Complexity Comparison:</a:t>
+            </a:r>
+          </a:p>
+        </p:txBody>
+      </p:sp>
+      <p:graphicFrame>
+        <p:nvGraphicFramePr>
+          <p:cNvPr id="2" name="Content Placeholder 1">
+            <a:extLst>
+              <a:ext uri="{FF2B5EF4-FFF2-40B4-BE49-F238E27FC236}">
+                <a16:creationId xmlns:a16="http://schemas.microsoft.com/office/drawing/2014/main" id="{E16FC514-2616-4E44-A226-22779CA87F9C}"/>
+              </a:ext>
+            </a:extLst>
+          </p:cNvPr>
+          <p:cNvGraphicFramePr>
+            <a:graphicFrameLocks noGrp="1"/>
+          </p:cNvGraphicFramePr>
           <p:nvPr>
             <p:ph idx="1"/>
-          </p:nvPr>
-        </p:nvSpPr>
-        <p:spPr/>
-        <p:txBody>
-          <a:bodyPr/>
-          <a:lstStyle/>
-          <a:p>
-            <a:endParaRPr lang="en-US"/>
+            <p:extLst>
+              <p:ext uri="{D42A27DB-BD31-4B8C-83A1-F6EECF244321}">
+                <p14:modId xmlns:p14="http://schemas.microsoft.com/office/powerpoint/2010/main" val="2717496919"/>
+              </p:ext>
+            </p:extLst>
+          </p:nvPr>
+        </p:nvGraphicFramePr>
+        <p:xfrm>
+          <a:off x="2394284" y="1690688"/>
+          <a:ext cx="7403431" cy="4066675"/>
+        </p:xfrm>
+        <a:graphic>
+          <a:graphicData uri="http://schemas.openxmlformats.org/drawingml/2006/table">
+            <a:tbl>
+              <a:tblPr firstRow="1" firstCol="1" bandRow="1"/>
+              <a:tblGrid>
+                <a:gridCol w="1003855">
+                  <a:extLst>
+                    <a:ext uri="{9D8B030D-6E8A-4147-A177-3AD203B41FA5}">
+                      <a16:colId xmlns:a16="http://schemas.microsoft.com/office/drawing/2014/main" val="3235219173"/>
+                    </a:ext>
+                  </a:extLst>
+                </a:gridCol>
+                <a:gridCol w="2133192">
+                  <a:extLst>
+                    <a:ext uri="{9D8B030D-6E8A-4147-A177-3AD203B41FA5}">
+                      <a16:colId xmlns:a16="http://schemas.microsoft.com/office/drawing/2014/main" val="1229366663"/>
+                    </a:ext>
+                  </a:extLst>
+                </a:gridCol>
+                <a:gridCol w="2133192">
+                  <a:extLst>
+                    <a:ext uri="{9D8B030D-6E8A-4147-A177-3AD203B41FA5}">
+                      <a16:colId xmlns:a16="http://schemas.microsoft.com/office/drawing/2014/main" val="1809128872"/>
+                    </a:ext>
+                  </a:extLst>
+                </a:gridCol>
+                <a:gridCol w="2133192">
+                  <a:extLst>
+                    <a:ext uri="{9D8B030D-6E8A-4147-A177-3AD203B41FA5}">
+                      <a16:colId xmlns:a16="http://schemas.microsoft.com/office/drawing/2014/main" val="3760958478"/>
+                    </a:ext>
+                  </a:extLst>
+                </a:gridCol>
+              </a:tblGrid>
+              <a:tr h="813335">
+                <a:tc>
+                  <a:txBody>
+                    <a:bodyPr/>
+                    <a:lstStyle/>
+                    <a:p>
+                      <a:pPr marL="0" marR="0" algn="ctr" fontAlgn="base">
+                        <a:lnSpc>
+                          <a:spcPct val="107000"/>
+                        </a:lnSpc>
+                        <a:spcBef>
+                          <a:spcPts val="0"/>
+                        </a:spcBef>
+                        <a:spcAft>
+                          <a:spcPts val="0"/>
+                        </a:spcAft>
+                      </a:pPr>
+                      <a:r>
+                        <a:rPr lang="en-US" sz="1300" b="1">
+                          <a:effectLst/>
+                          <a:latin typeface="Times New Roman" panose="02020603050405020304" pitchFamily="18" charset="0"/>
+                          <a:ea typeface="Times New Roman" panose="02020603050405020304" pitchFamily="18" charset="0"/>
+                          <a:cs typeface="Times New Roman" panose="02020603050405020304" pitchFamily="18" charset="0"/>
+                        </a:rPr>
+                        <a:t>Algorithm</a:t>
+                      </a:r>
+                      <a:endParaRPr lang="en-US" sz="1100">
+                        <a:effectLst/>
+                        <a:latin typeface="Calibri" panose="020F0502020204030204" pitchFamily="34" charset="0"/>
+                        <a:ea typeface="Calibri" panose="020F0502020204030204" pitchFamily="34" charset="0"/>
+                        <a:cs typeface="Times New Roman" panose="02020603050405020304" pitchFamily="18" charset="0"/>
+                      </a:endParaRPr>
+                    </a:p>
+                  </a:txBody>
+                  <a:tcPr marL="38100" marR="38100" marT="39370" marB="39370" anchor="b">
+                    <a:lnL w="12700" cap="flat" cmpd="sng" algn="ctr">
+                      <a:solidFill>
+                        <a:srgbClr val="DFDFDF"/>
+                      </a:solidFill>
+                      <a:prstDash val="solid"/>
+                      <a:round/>
+                      <a:headEnd type="none" w="med" len="med"/>
+                      <a:tailEnd type="none" w="med" len="med"/>
+                    </a:lnL>
+                    <a:lnR w="12700" cap="flat" cmpd="sng" algn="ctr">
+                      <a:solidFill>
+                        <a:srgbClr val="DFDFDF"/>
+                      </a:solidFill>
+                      <a:prstDash val="solid"/>
+                      <a:round/>
+                      <a:headEnd type="none" w="med" len="med"/>
+                      <a:tailEnd type="none" w="med" len="med"/>
+                    </a:lnR>
+                    <a:lnT w="12700" cap="flat" cmpd="sng" algn="ctr">
+                      <a:solidFill>
+                        <a:srgbClr val="DFDFDF"/>
+                      </a:solidFill>
+                      <a:prstDash val="solid"/>
+                      <a:round/>
+                      <a:headEnd type="none" w="med" len="med"/>
+                      <a:tailEnd type="none" w="med" len="med"/>
+                    </a:lnT>
+                    <a:lnB w="12700" cap="flat" cmpd="sng" algn="ctr">
+                      <a:solidFill>
+                        <a:srgbClr val="DFDFDF"/>
+                      </a:solidFill>
+                      <a:prstDash val="solid"/>
+                      <a:round/>
+                      <a:headEnd type="none" w="med" len="med"/>
+                      <a:tailEnd type="none" w="med" len="med"/>
+                    </a:lnB>
+                  </a:tcPr>
+                </a:tc>
+                <a:tc gridSpan="3">
+                  <a:txBody>
+                    <a:bodyPr/>
+                    <a:lstStyle/>
+                    <a:p>
+                      <a:pPr marL="0" marR="0" algn="ctr" fontAlgn="base">
+                        <a:lnSpc>
+                          <a:spcPct val="107000"/>
+                        </a:lnSpc>
+                        <a:spcBef>
+                          <a:spcPts val="0"/>
+                        </a:spcBef>
+                        <a:spcAft>
+                          <a:spcPts val="0"/>
+                        </a:spcAft>
+                      </a:pPr>
+                      <a:r>
+                        <a:rPr lang="en-US" sz="1200" b="1" dirty="0">
+                          <a:effectLst/>
+                          <a:latin typeface="Times New Roman" panose="02020603050405020304" pitchFamily="18" charset="0"/>
+                          <a:ea typeface="Times New Roman" panose="02020603050405020304" pitchFamily="18" charset="0"/>
+                          <a:cs typeface="Times New Roman" panose="02020603050405020304" pitchFamily="18" charset="0"/>
+                        </a:rPr>
+                        <a:t>Time Complexity</a:t>
+                      </a:r>
+                      <a:endParaRPr lang="en-US" sz="1100" dirty="0">
+                        <a:effectLst/>
+                        <a:latin typeface="Calibri" panose="020F0502020204030204" pitchFamily="34" charset="0"/>
+                        <a:ea typeface="Calibri" panose="020F0502020204030204" pitchFamily="34" charset="0"/>
+                        <a:cs typeface="Times New Roman" panose="02020603050405020304" pitchFamily="18" charset="0"/>
+                      </a:endParaRPr>
+                    </a:p>
+                  </a:txBody>
+                  <a:tcPr marL="95250" marR="95250" marT="133350" marB="133350" anchor="ctr">
+                    <a:lnL w="12700" cap="flat" cmpd="sng" algn="ctr">
+                      <a:solidFill>
+                        <a:srgbClr val="DFDFDF"/>
+                      </a:solidFill>
+                      <a:prstDash val="solid"/>
+                      <a:round/>
+                      <a:headEnd type="none" w="med" len="med"/>
+                      <a:tailEnd type="none" w="med" len="med"/>
+                    </a:lnL>
+                    <a:lnR w="12700" cap="flat" cmpd="sng" algn="ctr">
+                      <a:solidFill>
+                        <a:srgbClr val="DFDFDF"/>
+                      </a:solidFill>
+                      <a:prstDash val="solid"/>
+                      <a:round/>
+                      <a:headEnd type="none" w="med" len="med"/>
+                      <a:tailEnd type="none" w="med" len="med"/>
+                    </a:lnR>
+                    <a:lnT w="12700" cap="flat" cmpd="sng" algn="ctr">
+                      <a:solidFill>
+                        <a:srgbClr val="DFDFDF"/>
+                      </a:solidFill>
+                      <a:prstDash val="solid"/>
+                      <a:round/>
+                      <a:headEnd type="none" w="med" len="med"/>
+                      <a:tailEnd type="none" w="med" len="med"/>
+                    </a:lnT>
+                    <a:lnB w="12700" cap="flat" cmpd="sng" algn="ctr">
+                      <a:solidFill>
+                        <a:srgbClr val="DFDFDF"/>
+                      </a:solidFill>
+                      <a:prstDash val="solid"/>
+                      <a:round/>
+                      <a:headEnd type="none" w="med" len="med"/>
+                      <a:tailEnd type="none" w="med" len="med"/>
+                    </a:lnB>
+                  </a:tcPr>
+                </a:tc>
+                <a:tc hMerge="1">
+                  <a:txBody>
+                    <a:bodyPr/>
+                    <a:lstStyle/>
+                    <a:p>
+                      <a:endParaRPr lang="en-US"/>
+                    </a:p>
+                  </a:txBody>
+                  <a:tcPr/>
+                </a:tc>
+                <a:tc hMerge="1">
+                  <a:txBody>
+                    <a:bodyPr/>
+                    <a:lstStyle/>
+                    <a:p>
+                      <a:endParaRPr lang="en-US"/>
+                    </a:p>
+                  </a:txBody>
+                  <a:tcPr/>
+                </a:tc>
+                <a:extLst>
+                  <a:ext uri="{0D108BD9-81ED-4DB2-BD59-A6C34878D82A}">
+                    <a16:rowId xmlns:a16="http://schemas.microsoft.com/office/drawing/2014/main" val="2703939788"/>
+                  </a:ext>
+                </a:extLst>
+              </a:tr>
+              <a:tr h="813335">
+                <a:tc>
+                  <a:txBody>
+                    <a:bodyPr/>
+                    <a:lstStyle/>
+                    <a:p>
+                      <a:pPr marL="0" marR="0" algn="ctr" fontAlgn="base">
+                        <a:lnSpc>
+                          <a:spcPct val="107000"/>
+                        </a:lnSpc>
+                        <a:spcBef>
+                          <a:spcPts val="0"/>
+                        </a:spcBef>
+                        <a:spcAft>
+                          <a:spcPts val="750"/>
+                        </a:spcAft>
+                      </a:pPr>
+                      <a:r>
+                        <a:rPr lang="en-US" sz="1300" b="1">
+                          <a:effectLst/>
+                          <a:latin typeface="Times New Roman" panose="02020603050405020304" pitchFamily="18" charset="0"/>
+                          <a:ea typeface="Times New Roman" panose="02020603050405020304" pitchFamily="18" charset="0"/>
+                          <a:cs typeface="Times New Roman" panose="02020603050405020304" pitchFamily="18" charset="0"/>
+                        </a:rPr>
+                        <a:t> </a:t>
+                      </a:r>
+                      <a:endParaRPr lang="en-US" sz="1100">
+                        <a:effectLst/>
+                        <a:latin typeface="Calibri" panose="020F0502020204030204" pitchFamily="34" charset="0"/>
+                        <a:ea typeface="Calibri" panose="020F0502020204030204" pitchFamily="34" charset="0"/>
+                        <a:cs typeface="Times New Roman" panose="02020603050405020304" pitchFamily="18" charset="0"/>
+                      </a:endParaRPr>
+                    </a:p>
+                  </a:txBody>
+                  <a:tcPr marL="38100" marR="38100" marT="39370" marB="39370" anchor="b">
+                    <a:lnL w="12700" cap="flat" cmpd="sng" algn="ctr">
+                      <a:solidFill>
+                        <a:srgbClr val="DFDFDF"/>
+                      </a:solidFill>
+                      <a:prstDash val="solid"/>
+                      <a:round/>
+                      <a:headEnd type="none" w="med" len="med"/>
+                      <a:tailEnd type="none" w="med" len="med"/>
+                    </a:lnL>
+                    <a:lnR w="12700" cap="flat" cmpd="sng" algn="ctr">
+                      <a:solidFill>
+                        <a:srgbClr val="DFDFDF"/>
+                      </a:solidFill>
+                      <a:prstDash val="solid"/>
+                      <a:round/>
+                      <a:headEnd type="none" w="med" len="med"/>
+                      <a:tailEnd type="none" w="med" len="med"/>
+                    </a:lnR>
+                    <a:lnT w="12700" cap="flat" cmpd="sng" algn="ctr">
+                      <a:solidFill>
+                        <a:srgbClr val="DFDFDF"/>
+                      </a:solidFill>
+                      <a:prstDash val="solid"/>
+                      <a:round/>
+                      <a:headEnd type="none" w="med" len="med"/>
+                      <a:tailEnd type="none" w="med" len="med"/>
+                    </a:lnT>
+                    <a:lnB w="12700" cap="flat" cmpd="sng" algn="ctr">
+                      <a:solidFill>
+                        <a:srgbClr val="DFDFDF"/>
+                      </a:solidFill>
+                      <a:prstDash val="solid"/>
+                      <a:round/>
+                      <a:headEnd type="none" w="med" len="med"/>
+                      <a:tailEnd type="none" w="med" len="med"/>
+                    </a:lnB>
+                  </a:tcPr>
+                </a:tc>
+                <a:tc>
+                  <a:txBody>
+                    <a:bodyPr/>
+                    <a:lstStyle/>
+                    <a:p>
+                      <a:pPr marL="0" marR="0" algn="ctr" fontAlgn="base">
+                        <a:lnSpc>
+                          <a:spcPct val="107000"/>
+                        </a:lnSpc>
+                        <a:spcBef>
+                          <a:spcPts val="0"/>
+                        </a:spcBef>
+                        <a:spcAft>
+                          <a:spcPts val="750"/>
+                        </a:spcAft>
+                      </a:pPr>
+                      <a:r>
+                        <a:rPr lang="en-US" sz="1200">
+                          <a:effectLst/>
+                          <a:latin typeface="Times New Roman" panose="02020603050405020304" pitchFamily="18" charset="0"/>
+                          <a:ea typeface="Times New Roman" panose="02020603050405020304" pitchFamily="18" charset="0"/>
+                          <a:cs typeface="Times New Roman" panose="02020603050405020304" pitchFamily="18" charset="0"/>
+                        </a:rPr>
+                        <a:t>Best</a:t>
+                      </a:r>
+                      <a:endParaRPr lang="en-US" sz="1100">
+                        <a:effectLst/>
+                        <a:latin typeface="Calibri" panose="020F0502020204030204" pitchFamily="34" charset="0"/>
+                        <a:ea typeface="Calibri" panose="020F0502020204030204" pitchFamily="34" charset="0"/>
+                        <a:cs typeface="Times New Roman" panose="02020603050405020304" pitchFamily="18" charset="0"/>
+                      </a:endParaRPr>
+                    </a:p>
+                  </a:txBody>
+                  <a:tcPr marL="95250" marR="95250" marT="133350" marB="133350" anchor="ctr">
+                    <a:lnL w="12700" cap="flat" cmpd="sng" algn="ctr">
+                      <a:solidFill>
+                        <a:srgbClr val="DFDFDF"/>
+                      </a:solidFill>
+                      <a:prstDash val="solid"/>
+                      <a:round/>
+                      <a:headEnd type="none" w="med" len="med"/>
+                      <a:tailEnd type="none" w="med" len="med"/>
+                    </a:lnL>
+                    <a:lnR w="12700" cap="flat" cmpd="sng" algn="ctr">
+                      <a:solidFill>
+                        <a:srgbClr val="DFDFDF"/>
+                      </a:solidFill>
+                      <a:prstDash val="solid"/>
+                      <a:round/>
+                      <a:headEnd type="none" w="med" len="med"/>
+                      <a:tailEnd type="none" w="med" len="med"/>
+                    </a:lnR>
+                    <a:lnT w="12700" cap="flat" cmpd="sng" algn="ctr">
+                      <a:solidFill>
+                        <a:srgbClr val="DFDFDF"/>
+                      </a:solidFill>
+                      <a:prstDash val="solid"/>
+                      <a:round/>
+                      <a:headEnd type="none" w="med" len="med"/>
+                      <a:tailEnd type="none" w="med" len="med"/>
+                    </a:lnT>
+                    <a:lnB w="12700" cap="flat" cmpd="sng" algn="ctr">
+                      <a:solidFill>
+                        <a:srgbClr val="DFDFDF"/>
+                      </a:solidFill>
+                      <a:prstDash val="solid"/>
+                      <a:round/>
+                      <a:headEnd type="none" w="med" len="med"/>
+                      <a:tailEnd type="none" w="med" len="med"/>
+                    </a:lnB>
+                  </a:tcPr>
+                </a:tc>
+                <a:tc>
+                  <a:txBody>
+                    <a:bodyPr/>
+                    <a:lstStyle/>
+                    <a:p>
+                      <a:pPr marL="0" marR="0" algn="ctr" fontAlgn="base">
+                        <a:lnSpc>
+                          <a:spcPct val="107000"/>
+                        </a:lnSpc>
+                        <a:spcBef>
+                          <a:spcPts val="0"/>
+                        </a:spcBef>
+                        <a:spcAft>
+                          <a:spcPts val="750"/>
+                        </a:spcAft>
+                      </a:pPr>
+                      <a:r>
+                        <a:rPr lang="en-US" sz="1200">
+                          <a:effectLst/>
+                          <a:latin typeface="Times New Roman" panose="02020603050405020304" pitchFamily="18" charset="0"/>
+                          <a:ea typeface="Times New Roman" panose="02020603050405020304" pitchFamily="18" charset="0"/>
+                          <a:cs typeface="Times New Roman" panose="02020603050405020304" pitchFamily="18" charset="0"/>
+                        </a:rPr>
+                        <a:t>Average</a:t>
+                      </a:r>
+                      <a:endParaRPr lang="en-US" sz="1100">
+                        <a:effectLst/>
+                        <a:latin typeface="Calibri" panose="020F0502020204030204" pitchFamily="34" charset="0"/>
+                        <a:ea typeface="Calibri" panose="020F0502020204030204" pitchFamily="34" charset="0"/>
+                        <a:cs typeface="Times New Roman" panose="02020603050405020304" pitchFamily="18" charset="0"/>
+                      </a:endParaRPr>
+                    </a:p>
+                  </a:txBody>
+                  <a:tcPr marL="95250" marR="95250" marT="133350" marB="133350" anchor="ctr">
+                    <a:lnL w="12700" cap="flat" cmpd="sng" algn="ctr">
+                      <a:solidFill>
+                        <a:srgbClr val="DFDFDF"/>
+                      </a:solidFill>
+                      <a:prstDash val="solid"/>
+                      <a:round/>
+                      <a:headEnd type="none" w="med" len="med"/>
+                      <a:tailEnd type="none" w="med" len="med"/>
+                    </a:lnL>
+                    <a:lnR w="12700" cap="flat" cmpd="sng" algn="ctr">
+                      <a:solidFill>
+                        <a:srgbClr val="DFDFDF"/>
+                      </a:solidFill>
+                      <a:prstDash val="solid"/>
+                      <a:round/>
+                      <a:headEnd type="none" w="med" len="med"/>
+                      <a:tailEnd type="none" w="med" len="med"/>
+                    </a:lnR>
+                    <a:lnT w="12700" cap="flat" cmpd="sng" algn="ctr">
+                      <a:solidFill>
+                        <a:srgbClr val="DFDFDF"/>
+                      </a:solidFill>
+                      <a:prstDash val="solid"/>
+                      <a:round/>
+                      <a:headEnd type="none" w="med" len="med"/>
+                      <a:tailEnd type="none" w="med" len="med"/>
+                    </a:lnT>
+                    <a:lnB w="12700" cap="flat" cmpd="sng" algn="ctr">
+                      <a:solidFill>
+                        <a:srgbClr val="DFDFDF"/>
+                      </a:solidFill>
+                      <a:prstDash val="solid"/>
+                      <a:round/>
+                      <a:headEnd type="none" w="med" len="med"/>
+                      <a:tailEnd type="none" w="med" len="med"/>
+                    </a:lnB>
+                  </a:tcPr>
+                </a:tc>
+                <a:tc>
+                  <a:txBody>
+                    <a:bodyPr/>
+                    <a:lstStyle/>
+                    <a:p>
+                      <a:pPr marL="0" marR="0" algn="ctr" fontAlgn="base">
+                        <a:lnSpc>
+                          <a:spcPct val="107000"/>
+                        </a:lnSpc>
+                        <a:spcBef>
+                          <a:spcPts val="0"/>
+                        </a:spcBef>
+                        <a:spcAft>
+                          <a:spcPts val="750"/>
+                        </a:spcAft>
+                      </a:pPr>
+                      <a:r>
+                        <a:rPr lang="en-US" sz="1200">
+                          <a:effectLst/>
+                          <a:latin typeface="Times New Roman" panose="02020603050405020304" pitchFamily="18" charset="0"/>
+                          <a:ea typeface="Times New Roman" panose="02020603050405020304" pitchFamily="18" charset="0"/>
+                          <a:cs typeface="Times New Roman" panose="02020603050405020304" pitchFamily="18" charset="0"/>
+                        </a:rPr>
+                        <a:t>Worst</a:t>
+                      </a:r>
+                      <a:endParaRPr lang="en-US" sz="1100">
+                        <a:effectLst/>
+                        <a:latin typeface="Calibri" panose="020F0502020204030204" pitchFamily="34" charset="0"/>
+                        <a:ea typeface="Calibri" panose="020F0502020204030204" pitchFamily="34" charset="0"/>
+                        <a:cs typeface="Times New Roman" panose="02020603050405020304" pitchFamily="18" charset="0"/>
+                      </a:endParaRPr>
+                    </a:p>
+                  </a:txBody>
+                  <a:tcPr marL="95250" marR="95250" marT="133350" marB="133350" anchor="ctr">
+                    <a:lnL w="12700" cap="flat" cmpd="sng" algn="ctr">
+                      <a:solidFill>
+                        <a:srgbClr val="DFDFDF"/>
+                      </a:solidFill>
+                      <a:prstDash val="solid"/>
+                      <a:round/>
+                      <a:headEnd type="none" w="med" len="med"/>
+                      <a:tailEnd type="none" w="med" len="med"/>
+                    </a:lnL>
+                    <a:lnR w="12700" cap="flat" cmpd="sng" algn="ctr">
+                      <a:solidFill>
+                        <a:srgbClr val="DFDFDF"/>
+                      </a:solidFill>
+                      <a:prstDash val="solid"/>
+                      <a:round/>
+                      <a:headEnd type="none" w="med" len="med"/>
+                      <a:tailEnd type="none" w="med" len="med"/>
+                    </a:lnR>
+                    <a:lnT w="12700" cap="flat" cmpd="sng" algn="ctr">
+                      <a:solidFill>
+                        <a:srgbClr val="DFDFDF"/>
+                      </a:solidFill>
+                      <a:prstDash val="solid"/>
+                      <a:round/>
+                      <a:headEnd type="none" w="med" len="med"/>
+                      <a:tailEnd type="none" w="med" len="med"/>
+                    </a:lnT>
+                    <a:lnB w="12700" cap="flat" cmpd="sng" algn="ctr">
+                      <a:solidFill>
+                        <a:srgbClr val="DFDFDF"/>
+                      </a:solidFill>
+                      <a:prstDash val="solid"/>
+                      <a:round/>
+                      <a:headEnd type="none" w="med" len="med"/>
+                      <a:tailEnd type="none" w="med" len="med"/>
+                    </a:lnB>
+                  </a:tcPr>
+                </a:tc>
+                <a:extLst>
+                  <a:ext uri="{0D108BD9-81ED-4DB2-BD59-A6C34878D82A}">
+                    <a16:rowId xmlns:a16="http://schemas.microsoft.com/office/drawing/2014/main" val="850051196"/>
+                  </a:ext>
+                </a:extLst>
+              </a:tr>
+              <a:tr h="813335">
+                <a:tc>
+                  <a:txBody>
+                    <a:bodyPr/>
+                    <a:lstStyle/>
+                    <a:p>
+                      <a:pPr marL="0" marR="0" algn="ctr" fontAlgn="base">
+                        <a:lnSpc>
+                          <a:spcPct val="107000"/>
+                        </a:lnSpc>
+                        <a:spcBef>
+                          <a:spcPts val="0"/>
+                        </a:spcBef>
+                        <a:spcAft>
+                          <a:spcPts val="750"/>
+                        </a:spcAft>
+                      </a:pPr>
+                      <a:r>
+                        <a:rPr lang="en-US" sz="1300" b="1">
+                          <a:effectLst/>
+                          <a:latin typeface="Times New Roman" panose="02020603050405020304" pitchFamily="18" charset="0"/>
+                          <a:ea typeface="Times New Roman" panose="02020603050405020304" pitchFamily="18" charset="0"/>
+                          <a:cs typeface="Times New Roman" panose="02020603050405020304" pitchFamily="18" charset="0"/>
+                        </a:rPr>
+                        <a:t>Quick Sort</a:t>
+                      </a:r>
+                      <a:endParaRPr lang="en-US" sz="1100">
+                        <a:effectLst/>
+                        <a:latin typeface="Calibri" panose="020F0502020204030204" pitchFamily="34" charset="0"/>
+                        <a:ea typeface="Calibri" panose="020F0502020204030204" pitchFamily="34" charset="0"/>
+                        <a:cs typeface="Times New Roman" panose="02020603050405020304" pitchFamily="18" charset="0"/>
+                      </a:endParaRPr>
+                    </a:p>
+                  </a:txBody>
+                  <a:tcPr marL="38100" marR="38100" marT="39370" marB="39370" anchor="b">
+                    <a:lnL w="12700" cap="flat" cmpd="sng" algn="ctr">
+                      <a:solidFill>
+                        <a:srgbClr val="DFDFDF"/>
+                      </a:solidFill>
+                      <a:prstDash val="solid"/>
+                      <a:round/>
+                      <a:headEnd type="none" w="med" len="med"/>
+                      <a:tailEnd type="none" w="med" len="med"/>
+                    </a:lnL>
+                    <a:lnR w="12700" cap="flat" cmpd="sng" algn="ctr">
+                      <a:solidFill>
+                        <a:srgbClr val="DFDFDF"/>
+                      </a:solidFill>
+                      <a:prstDash val="solid"/>
+                      <a:round/>
+                      <a:headEnd type="none" w="med" len="med"/>
+                      <a:tailEnd type="none" w="med" len="med"/>
+                    </a:lnR>
+                    <a:lnT w="12700" cap="flat" cmpd="sng" algn="ctr">
+                      <a:solidFill>
+                        <a:srgbClr val="DFDFDF"/>
+                      </a:solidFill>
+                      <a:prstDash val="solid"/>
+                      <a:round/>
+                      <a:headEnd type="none" w="med" len="med"/>
+                      <a:tailEnd type="none" w="med" len="med"/>
+                    </a:lnT>
+                    <a:lnB w="12700" cap="flat" cmpd="sng" algn="ctr">
+                      <a:solidFill>
+                        <a:srgbClr val="DFDFDF"/>
+                      </a:solidFill>
+                      <a:prstDash val="solid"/>
+                      <a:round/>
+                      <a:headEnd type="none" w="med" len="med"/>
+                      <a:tailEnd type="none" w="med" len="med"/>
+                    </a:lnB>
+                  </a:tcPr>
+                </a:tc>
+                <a:tc>
+                  <a:txBody>
+                    <a:bodyPr/>
+                    <a:lstStyle/>
+                    <a:p>
+                      <a:pPr marL="0" marR="0" algn="ctr" fontAlgn="base">
+                        <a:lnSpc>
+                          <a:spcPct val="107000"/>
+                        </a:lnSpc>
+                        <a:spcBef>
+                          <a:spcPts val="0"/>
+                        </a:spcBef>
+                        <a:spcAft>
+                          <a:spcPts val="750"/>
+                        </a:spcAft>
+                      </a:pPr>
+                      <a:r>
+                        <a:rPr lang="en-US" sz="1200">
+                          <a:effectLst/>
+                          <a:latin typeface="Times New Roman" panose="02020603050405020304" pitchFamily="18" charset="0"/>
+                          <a:ea typeface="Times New Roman" panose="02020603050405020304" pitchFamily="18" charset="0"/>
+                          <a:cs typeface="Times New Roman" panose="02020603050405020304" pitchFamily="18" charset="0"/>
+                        </a:rPr>
+                        <a:t>Ω(n*log(n))</a:t>
+                      </a:r>
+                      <a:endParaRPr lang="en-US" sz="1100">
+                        <a:effectLst/>
+                        <a:latin typeface="Calibri" panose="020F0502020204030204" pitchFamily="34" charset="0"/>
+                        <a:ea typeface="Calibri" panose="020F0502020204030204" pitchFamily="34" charset="0"/>
+                        <a:cs typeface="Times New Roman" panose="02020603050405020304" pitchFamily="18" charset="0"/>
+                      </a:endParaRPr>
+                    </a:p>
+                  </a:txBody>
+                  <a:tcPr marL="95250" marR="95250" marT="133350" marB="133350" anchor="ctr">
+                    <a:lnL w="12700" cap="flat" cmpd="sng" algn="ctr">
+                      <a:solidFill>
+                        <a:srgbClr val="DFDFDF"/>
+                      </a:solidFill>
+                      <a:prstDash val="solid"/>
+                      <a:round/>
+                      <a:headEnd type="none" w="med" len="med"/>
+                      <a:tailEnd type="none" w="med" len="med"/>
+                    </a:lnL>
+                    <a:lnR w="12700" cap="flat" cmpd="sng" algn="ctr">
+                      <a:solidFill>
+                        <a:srgbClr val="DFDFDF"/>
+                      </a:solidFill>
+                      <a:prstDash val="solid"/>
+                      <a:round/>
+                      <a:headEnd type="none" w="med" len="med"/>
+                      <a:tailEnd type="none" w="med" len="med"/>
+                    </a:lnR>
+                    <a:lnT w="12700" cap="flat" cmpd="sng" algn="ctr">
+                      <a:solidFill>
+                        <a:srgbClr val="DFDFDF"/>
+                      </a:solidFill>
+                      <a:prstDash val="solid"/>
+                      <a:round/>
+                      <a:headEnd type="none" w="med" len="med"/>
+                      <a:tailEnd type="none" w="med" len="med"/>
+                    </a:lnT>
+                    <a:lnB w="12700" cap="flat" cmpd="sng" algn="ctr">
+                      <a:solidFill>
+                        <a:srgbClr val="DFDFDF"/>
+                      </a:solidFill>
+                      <a:prstDash val="solid"/>
+                      <a:round/>
+                      <a:headEnd type="none" w="med" len="med"/>
+                      <a:tailEnd type="none" w="med" len="med"/>
+                    </a:lnB>
+                  </a:tcPr>
+                </a:tc>
+                <a:tc>
+                  <a:txBody>
+                    <a:bodyPr/>
+                    <a:lstStyle/>
+                    <a:p>
+                      <a:pPr marL="0" marR="0" algn="ctr" fontAlgn="base">
+                        <a:lnSpc>
+                          <a:spcPct val="107000"/>
+                        </a:lnSpc>
+                        <a:spcBef>
+                          <a:spcPts val="0"/>
+                        </a:spcBef>
+                        <a:spcAft>
+                          <a:spcPts val="750"/>
+                        </a:spcAft>
+                      </a:pPr>
+                      <a:r>
+                        <a:rPr lang="en-US" sz="1200">
+                          <a:effectLst/>
+                          <a:latin typeface="Times New Roman" panose="02020603050405020304" pitchFamily="18" charset="0"/>
+                          <a:ea typeface="Times New Roman" panose="02020603050405020304" pitchFamily="18" charset="0"/>
+                          <a:cs typeface="Times New Roman" panose="02020603050405020304" pitchFamily="18" charset="0"/>
+                        </a:rPr>
+                        <a:t>θ(n*log(n))</a:t>
+                      </a:r>
+                      <a:endParaRPr lang="en-US" sz="1100">
+                        <a:effectLst/>
+                        <a:latin typeface="Calibri" panose="020F0502020204030204" pitchFamily="34" charset="0"/>
+                        <a:ea typeface="Calibri" panose="020F0502020204030204" pitchFamily="34" charset="0"/>
+                        <a:cs typeface="Times New Roman" panose="02020603050405020304" pitchFamily="18" charset="0"/>
+                      </a:endParaRPr>
+                    </a:p>
+                  </a:txBody>
+                  <a:tcPr marL="95250" marR="95250" marT="133350" marB="133350" anchor="ctr">
+                    <a:lnL w="12700" cap="flat" cmpd="sng" algn="ctr">
+                      <a:solidFill>
+                        <a:srgbClr val="DFDFDF"/>
+                      </a:solidFill>
+                      <a:prstDash val="solid"/>
+                      <a:round/>
+                      <a:headEnd type="none" w="med" len="med"/>
+                      <a:tailEnd type="none" w="med" len="med"/>
+                    </a:lnL>
+                    <a:lnR w="12700" cap="flat" cmpd="sng" algn="ctr">
+                      <a:solidFill>
+                        <a:srgbClr val="DFDFDF"/>
+                      </a:solidFill>
+                      <a:prstDash val="solid"/>
+                      <a:round/>
+                      <a:headEnd type="none" w="med" len="med"/>
+                      <a:tailEnd type="none" w="med" len="med"/>
+                    </a:lnR>
+                    <a:lnT w="12700" cap="flat" cmpd="sng" algn="ctr">
+                      <a:solidFill>
+                        <a:srgbClr val="DFDFDF"/>
+                      </a:solidFill>
+                      <a:prstDash val="solid"/>
+                      <a:round/>
+                      <a:headEnd type="none" w="med" len="med"/>
+                      <a:tailEnd type="none" w="med" len="med"/>
+                    </a:lnT>
+                    <a:lnB w="12700" cap="flat" cmpd="sng" algn="ctr">
+                      <a:solidFill>
+                        <a:srgbClr val="DFDFDF"/>
+                      </a:solidFill>
+                      <a:prstDash val="solid"/>
+                      <a:round/>
+                      <a:headEnd type="none" w="med" len="med"/>
+                      <a:tailEnd type="none" w="med" len="med"/>
+                    </a:lnB>
+                  </a:tcPr>
+                </a:tc>
+                <a:tc>
+                  <a:txBody>
+                    <a:bodyPr/>
+                    <a:lstStyle/>
+                    <a:p>
+                      <a:pPr marL="0" marR="0" algn="ctr" fontAlgn="base">
+                        <a:lnSpc>
+                          <a:spcPct val="107000"/>
+                        </a:lnSpc>
+                        <a:spcBef>
+                          <a:spcPts val="0"/>
+                        </a:spcBef>
+                        <a:spcAft>
+                          <a:spcPts val="750"/>
+                        </a:spcAft>
+                      </a:pPr>
+                      <a:r>
+                        <a:rPr lang="en-US" sz="1200">
+                          <a:effectLst/>
+                          <a:latin typeface="Times New Roman" panose="02020603050405020304" pitchFamily="18" charset="0"/>
+                          <a:ea typeface="Times New Roman" panose="02020603050405020304" pitchFamily="18" charset="0"/>
+                          <a:cs typeface="Times New Roman" panose="02020603050405020304" pitchFamily="18" charset="0"/>
+                        </a:rPr>
+                        <a:t>O(n^2)</a:t>
+                      </a:r>
+                      <a:endParaRPr lang="en-US" sz="1100">
+                        <a:effectLst/>
+                        <a:latin typeface="Calibri" panose="020F0502020204030204" pitchFamily="34" charset="0"/>
+                        <a:ea typeface="Calibri" panose="020F0502020204030204" pitchFamily="34" charset="0"/>
+                        <a:cs typeface="Times New Roman" panose="02020603050405020304" pitchFamily="18" charset="0"/>
+                      </a:endParaRPr>
+                    </a:p>
+                  </a:txBody>
+                  <a:tcPr marL="95250" marR="95250" marT="133350" marB="133350" anchor="ctr">
+                    <a:lnL w="12700" cap="flat" cmpd="sng" algn="ctr">
+                      <a:solidFill>
+                        <a:srgbClr val="DFDFDF"/>
+                      </a:solidFill>
+                      <a:prstDash val="solid"/>
+                      <a:round/>
+                      <a:headEnd type="none" w="med" len="med"/>
+                      <a:tailEnd type="none" w="med" len="med"/>
+                    </a:lnL>
+                    <a:lnR w="12700" cap="flat" cmpd="sng" algn="ctr">
+                      <a:solidFill>
+                        <a:srgbClr val="DFDFDF"/>
+                      </a:solidFill>
+                      <a:prstDash val="solid"/>
+                      <a:round/>
+                      <a:headEnd type="none" w="med" len="med"/>
+                      <a:tailEnd type="none" w="med" len="med"/>
+                    </a:lnR>
+                    <a:lnT w="12700" cap="flat" cmpd="sng" algn="ctr">
+                      <a:solidFill>
+                        <a:srgbClr val="DFDFDF"/>
+                      </a:solidFill>
+                      <a:prstDash val="solid"/>
+                      <a:round/>
+                      <a:headEnd type="none" w="med" len="med"/>
+                      <a:tailEnd type="none" w="med" len="med"/>
+                    </a:lnT>
+                    <a:lnB w="12700" cap="flat" cmpd="sng" algn="ctr">
+                      <a:solidFill>
+                        <a:srgbClr val="DFDFDF"/>
+                      </a:solidFill>
+                      <a:prstDash val="solid"/>
+                      <a:round/>
+                      <a:headEnd type="none" w="med" len="med"/>
+                      <a:tailEnd type="none" w="med" len="med"/>
+                    </a:lnB>
+                  </a:tcPr>
+                </a:tc>
+                <a:extLst>
+                  <a:ext uri="{0D108BD9-81ED-4DB2-BD59-A6C34878D82A}">
+                    <a16:rowId xmlns:a16="http://schemas.microsoft.com/office/drawing/2014/main" val="477298968"/>
+                  </a:ext>
+                </a:extLst>
+              </a:tr>
+              <a:tr h="813335">
+                <a:tc>
+                  <a:txBody>
+                    <a:bodyPr/>
+                    <a:lstStyle/>
+                    <a:p>
+                      <a:pPr marL="0" marR="0" algn="ctr" fontAlgn="base">
+                        <a:lnSpc>
+                          <a:spcPct val="107000"/>
+                        </a:lnSpc>
+                        <a:spcBef>
+                          <a:spcPts val="0"/>
+                        </a:spcBef>
+                        <a:spcAft>
+                          <a:spcPts val="750"/>
+                        </a:spcAft>
+                      </a:pPr>
+                      <a:r>
+                        <a:rPr lang="en-US" sz="1300" b="1">
+                          <a:effectLst/>
+                          <a:latin typeface="Times New Roman" panose="02020603050405020304" pitchFamily="18" charset="0"/>
+                          <a:ea typeface="Times New Roman" panose="02020603050405020304" pitchFamily="18" charset="0"/>
+                          <a:cs typeface="Times New Roman" panose="02020603050405020304" pitchFamily="18" charset="0"/>
+                        </a:rPr>
+                        <a:t>Merge Sort</a:t>
+                      </a:r>
+                      <a:endParaRPr lang="en-US" sz="1100">
+                        <a:effectLst/>
+                        <a:latin typeface="Calibri" panose="020F0502020204030204" pitchFamily="34" charset="0"/>
+                        <a:ea typeface="Calibri" panose="020F0502020204030204" pitchFamily="34" charset="0"/>
+                        <a:cs typeface="Times New Roman" panose="02020603050405020304" pitchFamily="18" charset="0"/>
+                      </a:endParaRPr>
+                    </a:p>
+                  </a:txBody>
+                  <a:tcPr marL="38100" marR="38100" marT="39370" marB="39370" anchor="b">
+                    <a:lnL w="12700" cap="flat" cmpd="sng" algn="ctr">
+                      <a:solidFill>
+                        <a:srgbClr val="DFDFDF"/>
+                      </a:solidFill>
+                      <a:prstDash val="solid"/>
+                      <a:round/>
+                      <a:headEnd type="none" w="med" len="med"/>
+                      <a:tailEnd type="none" w="med" len="med"/>
+                    </a:lnL>
+                    <a:lnR w="12700" cap="flat" cmpd="sng" algn="ctr">
+                      <a:solidFill>
+                        <a:srgbClr val="DFDFDF"/>
+                      </a:solidFill>
+                      <a:prstDash val="solid"/>
+                      <a:round/>
+                      <a:headEnd type="none" w="med" len="med"/>
+                      <a:tailEnd type="none" w="med" len="med"/>
+                    </a:lnR>
+                    <a:lnT w="12700" cap="flat" cmpd="sng" algn="ctr">
+                      <a:solidFill>
+                        <a:srgbClr val="DFDFDF"/>
+                      </a:solidFill>
+                      <a:prstDash val="solid"/>
+                      <a:round/>
+                      <a:headEnd type="none" w="med" len="med"/>
+                      <a:tailEnd type="none" w="med" len="med"/>
+                    </a:lnT>
+                    <a:lnB w="12700" cap="flat" cmpd="sng" algn="ctr">
+                      <a:solidFill>
+                        <a:srgbClr val="DFDFDF"/>
+                      </a:solidFill>
+                      <a:prstDash val="solid"/>
+                      <a:round/>
+                      <a:headEnd type="none" w="med" len="med"/>
+                      <a:tailEnd type="none" w="med" len="med"/>
+                    </a:lnB>
+                  </a:tcPr>
+                </a:tc>
+                <a:tc>
+                  <a:txBody>
+                    <a:bodyPr/>
+                    <a:lstStyle/>
+                    <a:p>
+                      <a:pPr marL="0" marR="0" algn="ctr" fontAlgn="base">
+                        <a:lnSpc>
+                          <a:spcPct val="107000"/>
+                        </a:lnSpc>
+                        <a:spcBef>
+                          <a:spcPts val="0"/>
+                        </a:spcBef>
+                        <a:spcAft>
+                          <a:spcPts val="750"/>
+                        </a:spcAft>
+                      </a:pPr>
+                      <a:r>
+                        <a:rPr lang="en-US" sz="1200">
+                          <a:effectLst/>
+                          <a:latin typeface="Times New Roman" panose="02020603050405020304" pitchFamily="18" charset="0"/>
+                          <a:ea typeface="Times New Roman" panose="02020603050405020304" pitchFamily="18" charset="0"/>
+                          <a:cs typeface="Times New Roman" panose="02020603050405020304" pitchFamily="18" charset="0"/>
+                        </a:rPr>
+                        <a:t>Ω(n*log(n))</a:t>
+                      </a:r>
+                      <a:endParaRPr lang="en-US" sz="1100">
+                        <a:effectLst/>
+                        <a:latin typeface="Calibri" panose="020F0502020204030204" pitchFamily="34" charset="0"/>
+                        <a:ea typeface="Calibri" panose="020F0502020204030204" pitchFamily="34" charset="0"/>
+                        <a:cs typeface="Times New Roman" panose="02020603050405020304" pitchFamily="18" charset="0"/>
+                      </a:endParaRPr>
+                    </a:p>
+                  </a:txBody>
+                  <a:tcPr marL="95250" marR="95250" marT="133350" marB="133350" anchor="ctr">
+                    <a:lnL w="12700" cap="flat" cmpd="sng" algn="ctr">
+                      <a:solidFill>
+                        <a:srgbClr val="DFDFDF"/>
+                      </a:solidFill>
+                      <a:prstDash val="solid"/>
+                      <a:round/>
+                      <a:headEnd type="none" w="med" len="med"/>
+                      <a:tailEnd type="none" w="med" len="med"/>
+                    </a:lnL>
+                    <a:lnR w="12700" cap="flat" cmpd="sng" algn="ctr">
+                      <a:solidFill>
+                        <a:srgbClr val="DFDFDF"/>
+                      </a:solidFill>
+                      <a:prstDash val="solid"/>
+                      <a:round/>
+                      <a:headEnd type="none" w="med" len="med"/>
+                      <a:tailEnd type="none" w="med" len="med"/>
+                    </a:lnR>
+                    <a:lnT w="12700" cap="flat" cmpd="sng" algn="ctr">
+                      <a:solidFill>
+                        <a:srgbClr val="DFDFDF"/>
+                      </a:solidFill>
+                      <a:prstDash val="solid"/>
+                      <a:round/>
+                      <a:headEnd type="none" w="med" len="med"/>
+                      <a:tailEnd type="none" w="med" len="med"/>
+                    </a:lnT>
+                    <a:lnB w="12700" cap="flat" cmpd="sng" algn="ctr">
+                      <a:solidFill>
+                        <a:srgbClr val="DFDFDF"/>
+                      </a:solidFill>
+                      <a:prstDash val="solid"/>
+                      <a:round/>
+                      <a:headEnd type="none" w="med" len="med"/>
+                      <a:tailEnd type="none" w="med" len="med"/>
+                    </a:lnB>
+                  </a:tcPr>
+                </a:tc>
+                <a:tc>
+                  <a:txBody>
+                    <a:bodyPr/>
+                    <a:lstStyle/>
+                    <a:p>
+                      <a:pPr marL="0" marR="0" algn="ctr" fontAlgn="base">
+                        <a:lnSpc>
+                          <a:spcPct val="107000"/>
+                        </a:lnSpc>
+                        <a:spcBef>
+                          <a:spcPts val="0"/>
+                        </a:spcBef>
+                        <a:spcAft>
+                          <a:spcPts val="750"/>
+                        </a:spcAft>
+                      </a:pPr>
+                      <a:r>
+                        <a:rPr lang="en-US" sz="1200">
+                          <a:effectLst/>
+                          <a:latin typeface="Times New Roman" panose="02020603050405020304" pitchFamily="18" charset="0"/>
+                          <a:ea typeface="Times New Roman" panose="02020603050405020304" pitchFamily="18" charset="0"/>
+                          <a:cs typeface="Times New Roman" panose="02020603050405020304" pitchFamily="18" charset="0"/>
+                        </a:rPr>
+                        <a:t>θ(n*log(n))</a:t>
+                      </a:r>
+                      <a:endParaRPr lang="en-US" sz="1100">
+                        <a:effectLst/>
+                        <a:latin typeface="Calibri" panose="020F0502020204030204" pitchFamily="34" charset="0"/>
+                        <a:ea typeface="Calibri" panose="020F0502020204030204" pitchFamily="34" charset="0"/>
+                        <a:cs typeface="Times New Roman" panose="02020603050405020304" pitchFamily="18" charset="0"/>
+                      </a:endParaRPr>
+                    </a:p>
+                  </a:txBody>
+                  <a:tcPr marL="95250" marR="95250" marT="133350" marB="133350" anchor="ctr">
+                    <a:lnL w="12700" cap="flat" cmpd="sng" algn="ctr">
+                      <a:solidFill>
+                        <a:srgbClr val="DFDFDF"/>
+                      </a:solidFill>
+                      <a:prstDash val="solid"/>
+                      <a:round/>
+                      <a:headEnd type="none" w="med" len="med"/>
+                      <a:tailEnd type="none" w="med" len="med"/>
+                    </a:lnL>
+                    <a:lnR w="12700" cap="flat" cmpd="sng" algn="ctr">
+                      <a:solidFill>
+                        <a:srgbClr val="DFDFDF"/>
+                      </a:solidFill>
+                      <a:prstDash val="solid"/>
+                      <a:round/>
+                      <a:headEnd type="none" w="med" len="med"/>
+                      <a:tailEnd type="none" w="med" len="med"/>
+                    </a:lnR>
+                    <a:lnT w="12700" cap="flat" cmpd="sng" algn="ctr">
+                      <a:solidFill>
+                        <a:srgbClr val="DFDFDF"/>
+                      </a:solidFill>
+                      <a:prstDash val="solid"/>
+                      <a:round/>
+                      <a:headEnd type="none" w="med" len="med"/>
+                      <a:tailEnd type="none" w="med" len="med"/>
+                    </a:lnT>
+                    <a:lnB w="12700" cap="flat" cmpd="sng" algn="ctr">
+                      <a:solidFill>
+                        <a:srgbClr val="DFDFDF"/>
+                      </a:solidFill>
+                      <a:prstDash val="solid"/>
+                      <a:round/>
+                      <a:headEnd type="none" w="med" len="med"/>
+                      <a:tailEnd type="none" w="med" len="med"/>
+                    </a:lnB>
+                  </a:tcPr>
+                </a:tc>
+                <a:tc>
+                  <a:txBody>
+                    <a:bodyPr/>
+                    <a:lstStyle/>
+                    <a:p>
+                      <a:pPr marL="0" marR="0" algn="ctr" fontAlgn="base">
+                        <a:lnSpc>
+                          <a:spcPct val="107000"/>
+                        </a:lnSpc>
+                        <a:spcBef>
+                          <a:spcPts val="0"/>
+                        </a:spcBef>
+                        <a:spcAft>
+                          <a:spcPts val="750"/>
+                        </a:spcAft>
+                      </a:pPr>
+                      <a:r>
+                        <a:rPr lang="en-US" sz="1200">
+                          <a:effectLst/>
+                          <a:latin typeface="Times New Roman" panose="02020603050405020304" pitchFamily="18" charset="0"/>
+                          <a:ea typeface="Times New Roman" panose="02020603050405020304" pitchFamily="18" charset="0"/>
+                          <a:cs typeface="Times New Roman" panose="02020603050405020304" pitchFamily="18" charset="0"/>
+                        </a:rPr>
+                        <a:t>O(n*log(n))</a:t>
+                      </a:r>
+                      <a:endParaRPr lang="en-US" sz="1100">
+                        <a:effectLst/>
+                        <a:latin typeface="Calibri" panose="020F0502020204030204" pitchFamily="34" charset="0"/>
+                        <a:ea typeface="Calibri" panose="020F0502020204030204" pitchFamily="34" charset="0"/>
+                        <a:cs typeface="Times New Roman" panose="02020603050405020304" pitchFamily="18" charset="0"/>
+                      </a:endParaRPr>
+                    </a:p>
+                  </a:txBody>
+                  <a:tcPr marL="95250" marR="95250" marT="133350" marB="133350" anchor="ctr">
+                    <a:lnL w="12700" cap="flat" cmpd="sng" algn="ctr">
+                      <a:solidFill>
+                        <a:srgbClr val="DFDFDF"/>
+                      </a:solidFill>
+                      <a:prstDash val="solid"/>
+                      <a:round/>
+                      <a:headEnd type="none" w="med" len="med"/>
+                      <a:tailEnd type="none" w="med" len="med"/>
+                    </a:lnL>
+                    <a:lnR w="12700" cap="flat" cmpd="sng" algn="ctr">
+                      <a:solidFill>
+                        <a:srgbClr val="DFDFDF"/>
+                      </a:solidFill>
+                      <a:prstDash val="solid"/>
+                      <a:round/>
+                      <a:headEnd type="none" w="med" len="med"/>
+                      <a:tailEnd type="none" w="med" len="med"/>
+                    </a:lnR>
+                    <a:lnT w="12700" cap="flat" cmpd="sng" algn="ctr">
+                      <a:solidFill>
+                        <a:srgbClr val="DFDFDF"/>
+                      </a:solidFill>
+                      <a:prstDash val="solid"/>
+                      <a:round/>
+                      <a:headEnd type="none" w="med" len="med"/>
+                      <a:tailEnd type="none" w="med" len="med"/>
+                    </a:lnT>
+                    <a:lnB w="12700" cap="flat" cmpd="sng" algn="ctr">
+                      <a:solidFill>
+                        <a:srgbClr val="DFDFDF"/>
+                      </a:solidFill>
+                      <a:prstDash val="solid"/>
+                      <a:round/>
+                      <a:headEnd type="none" w="med" len="med"/>
+                      <a:tailEnd type="none" w="med" len="med"/>
+                    </a:lnB>
+                  </a:tcPr>
+                </a:tc>
+                <a:extLst>
+                  <a:ext uri="{0D108BD9-81ED-4DB2-BD59-A6C34878D82A}">
+                    <a16:rowId xmlns:a16="http://schemas.microsoft.com/office/drawing/2014/main" val="2175348755"/>
+                  </a:ext>
+                </a:extLst>
+              </a:tr>
+              <a:tr h="813335">
+                <a:tc>
+                  <a:txBody>
+                    <a:bodyPr/>
+                    <a:lstStyle/>
+                    <a:p>
+                      <a:pPr marL="0" marR="0" algn="ctr" fontAlgn="base">
+                        <a:lnSpc>
+                          <a:spcPct val="107000"/>
+                        </a:lnSpc>
+                        <a:spcBef>
+                          <a:spcPts val="0"/>
+                        </a:spcBef>
+                        <a:spcAft>
+                          <a:spcPts val="750"/>
+                        </a:spcAft>
+                      </a:pPr>
+                      <a:r>
+                        <a:rPr lang="en-US" sz="1300" b="1">
+                          <a:effectLst/>
+                          <a:latin typeface="Times New Roman" panose="02020603050405020304" pitchFamily="18" charset="0"/>
+                          <a:ea typeface="Times New Roman" panose="02020603050405020304" pitchFamily="18" charset="0"/>
+                          <a:cs typeface="Times New Roman" panose="02020603050405020304" pitchFamily="18" charset="0"/>
+                        </a:rPr>
+                        <a:t>Tim Sort</a:t>
+                      </a:r>
+                      <a:endParaRPr lang="en-US" sz="1100">
+                        <a:effectLst/>
+                        <a:latin typeface="Calibri" panose="020F0502020204030204" pitchFamily="34" charset="0"/>
+                        <a:ea typeface="Calibri" panose="020F0502020204030204" pitchFamily="34" charset="0"/>
+                        <a:cs typeface="Times New Roman" panose="02020603050405020304" pitchFamily="18" charset="0"/>
+                      </a:endParaRPr>
+                    </a:p>
+                  </a:txBody>
+                  <a:tcPr marL="38100" marR="38100" marT="39370" marB="39370" anchor="b">
+                    <a:lnL w="12700" cap="flat" cmpd="sng" algn="ctr">
+                      <a:solidFill>
+                        <a:srgbClr val="DFDFDF"/>
+                      </a:solidFill>
+                      <a:prstDash val="solid"/>
+                      <a:round/>
+                      <a:headEnd type="none" w="med" len="med"/>
+                      <a:tailEnd type="none" w="med" len="med"/>
+                    </a:lnL>
+                    <a:lnR w="12700" cap="flat" cmpd="sng" algn="ctr">
+                      <a:solidFill>
+                        <a:srgbClr val="DFDFDF"/>
+                      </a:solidFill>
+                      <a:prstDash val="solid"/>
+                      <a:round/>
+                      <a:headEnd type="none" w="med" len="med"/>
+                      <a:tailEnd type="none" w="med" len="med"/>
+                    </a:lnR>
+                    <a:lnT w="12700" cap="flat" cmpd="sng" algn="ctr">
+                      <a:solidFill>
+                        <a:srgbClr val="DFDFDF"/>
+                      </a:solidFill>
+                      <a:prstDash val="solid"/>
+                      <a:round/>
+                      <a:headEnd type="none" w="med" len="med"/>
+                      <a:tailEnd type="none" w="med" len="med"/>
+                    </a:lnT>
+                    <a:lnB w="12700" cap="flat" cmpd="sng" algn="ctr">
+                      <a:solidFill>
+                        <a:srgbClr val="DFDFDF"/>
+                      </a:solidFill>
+                      <a:prstDash val="solid"/>
+                      <a:round/>
+                      <a:headEnd type="none" w="med" len="med"/>
+                      <a:tailEnd type="none" w="med" len="med"/>
+                    </a:lnB>
+                  </a:tcPr>
+                </a:tc>
+                <a:tc>
+                  <a:txBody>
+                    <a:bodyPr/>
+                    <a:lstStyle/>
+                    <a:p>
+                      <a:pPr marL="0" marR="0" algn="ctr" fontAlgn="base">
+                        <a:lnSpc>
+                          <a:spcPct val="107000"/>
+                        </a:lnSpc>
+                        <a:spcBef>
+                          <a:spcPts val="0"/>
+                        </a:spcBef>
+                        <a:spcAft>
+                          <a:spcPts val="750"/>
+                        </a:spcAft>
+                      </a:pPr>
+                      <a:r>
+                        <a:rPr lang="en-US" sz="1200">
+                          <a:effectLst/>
+                          <a:latin typeface="Times New Roman" panose="02020603050405020304" pitchFamily="18" charset="0"/>
+                          <a:ea typeface="Times New Roman" panose="02020603050405020304" pitchFamily="18" charset="0"/>
+                          <a:cs typeface="Times New Roman" panose="02020603050405020304" pitchFamily="18" charset="0"/>
+                        </a:rPr>
+                        <a:t>Ω(n)</a:t>
+                      </a:r>
+                      <a:endParaRPr lang="en-US" sz="1100">
+                        <a:effectLst/>
+                        <a:latin typeface="Calibri" panose="020F0502020204030204" pitchFamily="34" charset="0"/>
+                        <a:ea typeface="Calibri" panose="020F0502020204030204" pitchFamily="34" charset="0"/>
+                        <a:cs typeface="Times New Roman" panose="02020603050405020304" pitchFamily="18" charset="0"/>
+                      </a:endParaRPr>
+                    </a:p>
+                  </a:txBody>
+                  <a:tcPr marL="95250" marR="95250" marT="133350" marB="133350" anchor="ctr">
+                    <a:lnL w="12700" cap="flat" cmpd="sng" algn="ctr">
+                      <a:solidFill>
+                        <a:srgbClr val="DFDFDF"/>
+                      </a:solidFill>
+                      <a:prstDash val="solid"/>
+                      <a:round/>
+                      <a:headEnd type="none" w="med" len="med"/>
+                      <a:tailEnd type="none" w="med" len="med"/>
+                    </a:lnL>
+                    <a:lnR w="12700" cap="flat" cmpd="sng" algn="ctr">
+                      <a:solidFill>
+                        <a:srgbClr val="DFDFDF"/>
+                      </a:solidFill>
+                      <a:prstDash val="solid"/>
+                      <a:round/>
+                      <a:headEnd type="none" w="med" len="med"/>
+                      <a:tailEnd type="none" w="med" len="med"/>
+                    </a:lnR>
+                    <a:lnT w="12700" cap="flat" cmpd="sng" algn="ctr">
+                      <a:solidFill>
+                        <a:srgbClr val="DFDFDF"/>
+                      </a:solidFill>
+                      <a:prstDash val="solid"/>
+                      <a:round/>
+                      <a:headEnd type="none" w="med" len="med"/>
+                      <a:tailEnd type="none" w="med" len="med"/>
+                    </a:lnT>
+                    <a:lnB w="12700" cap="flat" cmpd="sng" algn="ctr">
+                      <a:solidFill>
+                        <a:srgbClr val="DFDFDF"/>
+                      </a:solidFill>
+                      <a:prstDash val="solid"/>
+                      <a:round/>
+                      <a:headEnd type="none" w="med" len="med"/>
+                      <a:tailEnd type="none" w="med" len="med"/>
+                    </a:lnB>
+                  </a:tcPr>
+                </a:tc>
+                <a:tc>
+                  <a:txBody>
+                    <a:bodyPr/>
+                    <a:lstStyle/>
+                    <a:p>
+                      <a:pPr marL="0" marR="0" algn="ctr" fontAlgn="base">
+                        <a:lnSpc>
+                          <a:spcPct val="107000"/>
+                        </a:lnSpc>
+                        <a:spcBef>
+                          <a:spcPts val="0"/>
+                        </a:spcBef>
+                        <a:spcAft>
+                          <a:spcPts val="750"/>
+                        </a:spcAft>
+                      </a:pPr>
+                      <a:r>
+                        <a:rPr lang="en-US" sz="1200">
+                          <a:effectLst/>
+                          <a:latin typeface="Times New Roman" panose="02020603050405020304" pitchFamily="18" charset="0"/>
+                          <a:ea typeface="Times New Roman" panose="02020603050405020304" pitchFamily="18" charset="0"/>
+                          <a:cs typeface="Times New Roman" panose="02020603050405020304" pitchFamily="18" charset="0"/>
+                        </a:rPr>
+                        <a:t>θ(n*log(n))</a:t>
+                      </a:r>
+                      <a:endParaRPr lang="en-US" sz="1100">
+                        <a:effectLst/>
+                        <a:latin typeface="Calibri" panose="020F0502020204030204" pitchFamily="34" charset="0"/>
+                        <a:ea typeface="Calibri" panose="020F0502020204030204" pitchFamily="34" charset="0"/>
+                        <a:cs typeface="Times New Roman" panose="02020603050405020304" pitchFamily="18" charset="0"/>
+                      </a:endParaRPr>
+                    </a:p>
+                  </a:txBody>
+                  <a:tcPr marL="95250" marR="95250" marT="133350" marB="133350" anchor="ctr">
+                    <a:lnL w="12700" cap="flat" cmpd="sng" algn="ctr">
+                      <a:solidFill>
+                        <a:srgbClr val="DFDFDF"/>
+                      </a:solidFill>
+                      <a:prstDash val="solid"/>
+                      <a:round/>
+                      <a:headEnd type="none" w="med" len="med"/>
+                      <a:tailEnd type="none" w="med" len="med"/>
+                    </a:lnL>
+                    <a:lnR w="12700" cap="flat" cmpd="sng" algn="ctr">
+                      <a:solidFill>
+                        <a:srgbClr val="DFDFDF"/>
+                      </a:solidFill>
+                      <a:prstDash val="solid"/>
+                      <a:round/>
+                      <a:headEnd type="none" w="med" len="med"/>
+                      <a:tailEnd type="none" w="med" len="med"/>
+                    </a:lnR>
+                    <a:lnT w="12700" cap="flat" cmpd="sng" algn="ctr">
+                      <a:solidFill>
+                        <a:srgbClr val="DFDFDF"/>
+                      </a:solidFill>
+                      <a:prstDash val="solid"/>
+                      <a:round/>
+                      <a:headEnd type="none" w="med" len="med"/>
+                      <a:tailEnd type="none" w="med" len="med"/>
+                    </a:lnT>
+                    <a:lnB w="12700" cap="flat" cmpd="sng" algn="ctr">
+                      <a:solidFill>
+                        <a:srgbClr val="DFDFDF"/>
+                      </a:solidFill>
+                      <a:prstDash val="solid"/>
+                      <a:round/>
+                      <a:headEnd type="none" w="med" len="med"/>
+                      <a:tailEnd type="none" w="med" len="med"/>
+                    </a:lnB>
+                  </a:tcPr>
+                </a:tc>
+                <a:tc>
+                  <a:txBody>
+                    <a:bodyPr/>
+                    <a:lstStyle/>
+                    <a:p>
+                      <a:pPr marL="0" marR="0" algn="ctr" fontAlgn="base">
+                        <a:lnSpc>
+                          <a:spcPct val="107000"/>
+                        </a:lnSpc>
+                        <a:spcBef>
+                          <a:spcPts val="0"/>
+                        </a:spcBef>
+                        <a:spcAft>
+                          <a:spcPts val="750"/>
+                        </a:spcAft>
+                      </a:pPr>
+                      <a:r>
+                        <a:rPr lang="en-US" sz="1200" dirty="0">
+                          <a:effectLst/>
+                          <a:latin typeface="Times New Roman" panose="02020603050405020304" pitchFamily="18" charset="0"/>
+                          <a:ea typeface="Times New Roman" panose="02020603050405020304" pitchFamily="18" charset="0"/>
+                          <a:cs typeface="Times New Roman" panose="02020603050405020304" pitchFamily="18" charset="0"/>
+                        </a:rPr>
+                        <a:t>O(n*log(n))</a:t>
+                      </a:r>
+                      <a:endParaRPr lang="en-US" sz="1100" dirty="0">
+                        <a:effectLst/>
+                        <a:latin typeface="Calibri" panose="020F0502020204030204" pitchFamily="34" charset="0"/>
+                        <a:ea typeface="Calibri" panose="020F0502020204030204" pitchFamily="34" charset="0"/>
+                        <a:cs typeface="Times New Roman" panose="02020603050405020304" pitchFamily="18" charset="0"/>
+                      </a:endParaRPr>
+                    </a:p>
+                  </a:txBody>
+                  <a:tcPr marL="95250" marR="95250" marT="133350" marB="133350" anchor="ctr">
+                    <a:lnL w="12700" cap="flat" cmpd="sng" algn="ctr">
+                      <a:solidFill>
+                        <a:srgbClr val="DFDFDF"/>
+                      </a:solidFill>
+                      <a:prstDash val="solid"/>
+                      <a:round/>
+                      <a:headEnd type="none" w="med" len="med"/>
+                      <a:tailEnd type="none" w="med" len="med"/>
+                    </a:lnL>
+                    <a:lnR w="12700" cap="flat" cmpd="sng" algn="ctr">
+                      <a:solidFill>
+                        <a:srgbClr val="DFDFDF"/>
+                      </a:solidFill>
+                      <a:prstDash val="solid"/>
+                      <a:round/>
+                      <a:headEnd type="none" w="med" len="med"/>
+                      <a:tailEnd type="none" w="med" len="med"/>
+                    </a:lnR>
+                    <a:lnT w="12700" cap="flat" cmpd="sng" algn="ctr">
+                      <a:solidFill>
+                        <a:srgbClr val="DFDFDF"/>
+                      </a:solidFill>
+                      <a:prstDash val="solid"/>
+                      <a:round/>
+                      <a:headEnd type="none" w="med" len="med"/>
+                      <a:tailEnd type="none" w="med" len="med"/>
+                    </a:lnT>
+                    <a:lnB w="12700" cap="flat" cmpd="sng" algn="ctr">
+                      <a:solidFill>
+                        <a:srgbClr val="DFDFDF"/>
+                      </a:solidFill>
+                      <a:prstDash val="solid"/>
+                      <a:round/>
+                      <a:headEnd type="none" w="med" len="med"/>
+                      <a:tailEnd type="none" w="med" len="med"/>
+                    </a:lnB>
+                  </a:tcPr>
+                </a:tc>
+                <a:extLst>
+                  <a:ext uri="{0D108BD9-81ED-4DB2-BD59-A6C34878D82A}">
+                    <a16:rowId xmlns:a16="http://schemas.microsoft.com/office/drawing/2014/main" val="1447024075"/>
+                  </a:ext>
+                </a:extLst>
+              </a:tr>
+            </a:tbl>
+          </a:graphicData>
+        </a:graphic>
+      </p:graphicFrame>
+      <p:sp>
+        <p:nvSpPr>
+          <p:cNvPr id="3" name="Rectangle 2">
+            <a:extLst>
+              <a:ext uri="{FF2B5EF4-FFF2-40B4-BE49-F238E27FC236}">
+                <a16:creationId xmlns:a16="http://schemas.microsoft.com/office/drawing/2014/main" id="{571F3365-3AFD-451B-9F55-1A9513B38AF1}"/>
+              </a:ext>
+            </a:extLst>
+          </p:cNvPr>
+          <p:cNvSpPr/>
+          <p:nvPr/>
+        </p:nvSpPr>
+        <p:spPr>
+          <a:xfrm>
+            <a:off x="3692296" y="6117323"/>
+            <a:ext cx="4807406" cy="375552"/>
+          </a:xfrm>
+          <a:prstGeom prst="rect">
+            <a:avLst/>
+          </a:prstGeom>
+        </p:spPr>
+        <p:txBody>
+          <a:bodyPr wrap="none">
+            <a:spAutoFit/>
+          </a:bodyPr>
+          <a:lstStyle/>
+          <a:p>
+            <a:pPr>
+              <a:lnSpc>
+                <a:spcPct val="107000"/>
+              </a:lnSpc>
+              <a:spcAft>
+                <a:spcPts val="800"/>
+              </a:spcAft>
+            </a:pPr>
+            <a:r>
+              <a:rPr lang="en-US" u="sng" dirty="0">
+                <a:solidFill>
+                  <a:srgbClr val="0563C1"/>
+                </a:solidFill>
+                <a:latin typeface="Calibri" panose="020F0502020204030204" pitchFamily="34" charset="0"/>
+                <a:ea typeface="Calibri" panose="020F0502020204030204" pitchFamily="34" charset="0"/>
+                <a:cs typeface="Times New Roman" panose="02020603050405020304" pitchFamily="18" charset="0"/>
+                <a:hlinkClick r:id="rId2"/>
+              </a:rPr>
+              <a:t>https://www.youtube.com/watch?v=ZxLxf5xqqyE</a:t>
+            </a:r>
+            <a:endParaRPr lang="en-US" dirty="0">
+              <a:latin typeface="Calibri" panose="020F0502020204030204" pitchFamily="34" charset="0"/>
+              <a:ea typeface="Calibri" panose="020F0502020204030204" pitchFamily="34" charset="0"/>
+              <a:cs typeface="Times New Roman" panose="02020603050405020304" pitchFamily="18" charset="0"/>
+            </a:endParaRPr>
+          </a:p>
+        </p:txBody>
+      </p:sp>
+      <p:sp>
+        <p:nvSpPr>
+          <p:cNvPr id="6" name="Rectangle 5">
+            <a:extLst>
+              <a:ext uri="{FF2B5EF4-FFF2-40B4-BE49-F238E27FC236}">
+                <a16:creationId xmlns:a16="http://schemas.microsoft.com/office/drawing/2014/main" id="{416A0FF8-145B-4B42-B170-320AE2CD3E67}"/>
+              </a:ext>
+            </a:extLst>
+          </p:cNvPr>
+          <p:cNvSpPr/>
+          <p:nvPr/>
+        </p:nvSpPr>
+        <p:spPr>
+          <a:xfrm>
+            <a:off x="4690806" y="5855713"/>
+            <a:ext cx="2818400" cy="261610"/>
+          </a:xfrm>
+          <a:prstGeom prst="rect">
+            <a:avLst/>
+          </a:prstGeom>
+        </p:spPr>
+        <p:txBody>
+          <a:bodyPr wrap="none">
+            <a:spAutoFit/>
+          </a:bodyPr>
+          <a:lstStyle/>
+          <a:p>
+            <a:r>
+              <a:rPr lang="en-US" sz="1100" dirty="0">
+                <a:latin typeface="Calibri" panose="020F0502020204030204" pitchFamily="34" charset="0"/>
+                <a:ea typeface="Calibri" panose="020F0502020204030204" pitchFamily="34" charset="0"/>
+                <a:cs typeface="Times New Roman" panose="02020603050405020304" pitchFamily="18" charset="0"/>
+              </a:rPr>
+              <a:t>real time comparison of </a:t>
+            </a:r>
+            <a:r>
+              <a:rPr lang="en-US" sz="1100" dirty="0" err="1">
+                <a:latin typeface="Calibri" panose="020F0502020204030204" pitchFamily="34" charset="0"/>
+                <a:ea typeface="Calibri" panose="020F0502020204030204" pitchFamily="34" charset="0"/>
+                <a:cs typeface="Times New Roman" panose="02020603050405020304" pitchFamily="18" charset="0"/>
+              </a:rPr>
+              <a:t>Mergesort</a:t>
+            </a:r>
+            <a:r>
+              <a:rPr lang="en-US" sz="1100" dirty="0">
+                <a:latin typeface="Calibri" panose="020F0502020204030204" pitchFamily="34" charset="0"/>
+                <a:ea typeface="Calibri" panose="020F0502020204030204" pitchFamily="34" charset="0"/>
+                <a:cs typeface="Times New Roman" panose="02020603050405020304" pitchFamily="18" charset="0"/>
+              </a:rPr>
+              <a:t> vs </a:t>
+            </a:r>
+            <a:r>
+              <a:rPr lang="en-US" sz="1100" dirty="0" err="1">
+                <a:latin typeface="Calibri" panose="020F0502020204030204" pitchFamily="34" charset="0"/>
+                <a:ea typeface="Calibri" panose="020F0502020204030204" pitchFamily="34" charset="0"/>
+                <a:cs typeface="Times New Roman" panose="02020603050405020304" pitchFamily="18" charset="0"/>
+              </a:rPr>
+              <a:t>Timsort</a:t>
+            </a:r>
+            <a:r>
+              <a:rPr lang="en-US" sz="1100" dirty="0">
+                <a:latin typeface="Calibri" panose="020F0502020204030204" pitchFamily="34" charset="0"/>
+                <a:ea typeface="Calibri" panose="020F0502020204030204" pitchFamily="34" charset="0"/>
+                <a:cs typeface="Times New Roman" panose="02020603050405020304" pitchFamily="18" charset="0"/>
+              </a:rPr>
+              <a:t>:</a:t>
+            </a:r>
+            <a:endParaRPr lang="en-US" dirty="0"/>
           </a:p>
         </p:txBody>
       </p:sp>
@@ -6123,20 +7648,20 @@
 </file>
 
 <file path=customXml/item2.xml><?xml version="1.0" encoding="utf-8"?>
+<p:properties xmlns:p="http://schemas.microsoft.com/office/2006/metadata/properties" xmlns:xsi="http://www.w3.org/2001/XMLSchema-instance" xmlns:pc="http://schemas.microsoft.com/office/infopath/2007/PartnerControls">
+  <documentManagement>
+    <_activity xmlns="bdaba121-48a8-493b-9567-a1d720e935a1" xsi:nil="true"/>
+  </documentManagement>
+</p:properties>
+</file>
+
+<file path=customXml/item3.xml><?xml version="1.0" encoding="utf-8"?>
 <?mso-contentType ?>
 <FormTemplates xmlns="http://schemas.microsoft.com/sharepoint/v3/contenttype/forms">
   <Display>DocumentLibraryForm</Display>
   <Edit>DocumentLibraryForm</Edit>
   <New>DocumentLibraryForm</New>
 </FormTemplates>
-</file>
-
-<file path=customXml/item3.xml><?xml version="1.0" encoding="utf-8"?>
-<p:properties xmlns:p="http://schemas.microsoft.com/office/2006/metadata/properties" xmlns:xsi="http://www.w3.org/2001/XMLSchema-instance" xmlns:pc="http://schemas.microsoft.com/office/infopath/2007/PartnerControls">
-  <documentManagement>
-    <_activity xmlns="bdaba121-48a8-493b-9567-a1d720e935a1" xsi:nil="true"/>
-  </documentManagement>
-</p:properties>
 </file>
 
 <file path=customXml/itemProps1.xml><?xml version="1.0" encoding="utf-8"?>
@@ -6159,14 +7684,6 @@
 </file>
 
 <file path=customXml/itemProps2.xml><?xml version="1.0" encoding="utf-8"?>
-<ds:datastoreItem xmlns:ds="http://schemas.openxmlformats.org/officeDocument/2006/customXml" ds:itemID="{E133C991-2001-4127-8C22-801161A4C08A}">
-  <ds:schemaRefs>
-    <ds:schemaRef ds:uri="http://schemas.microsoft.com/sharepoint/v3/contenttype/forms"/>
-  </ds:schemaRefs>
-</ds:datastoreItem>
-</file>
-
-<file path=customXml/itemProps3.xml><?xml version="1.0" encoding="utf-8"?>
 <ds:datastoreItem xmlns:ds="http://schemas.openxmlformats.org/officeDocument/2006/customXml" ds:itemID="{5AFD10CD-42A2-464F-BCBC-377959371850}">
   <ds:schemaRefs>
     <ds:schemaRef ds:uri="http://purl.org/dc/dcmitype/"/>
@@ -6181,4 +7698,12 @@
     <ds:schemaRef ds:uri="http://schemas.microsoft.com/office/2006/metadata/properties"/>
   </ds:schemaRefs>
 </ds:datastoreItem>
+</file>
+
+<file path=customXml/itemProps3.xml><?xml version="1.0" encoding="utf-8"?>
+<ds:datastoreItem xmlns:ds="http://schemas.openxmlformats.org/officeDocument/2006/customXml" ds:itemID="{E133C991-2001-4127-8C22-801161A4C08A}">
+  <ds:schemaRefs>
+    <ds:schemaRef ds:uri="http://schemas.microsoft.com/sharepoint/v3/contenttype/forms"/>
+  </ds:schemaRefs>
+</ds:datastoreItem>
 </file>
</xml_diff>

<commit_message>
Added changes to slide 1
</commit_message>
<xml_diff>
--- a/Tim-Sort-Presentation.pptx
+++ b/Tim-Sort-Presentation.pptx
@@ -128,6 +128,30 @@
 
 <file path=ppt/changesInfos/changesInfo1.xml><?xml version="1.0" encoding="utf-8"?>
 <pc:chgInfo xmlns:a="http://schemas.openxmlformats.org/drawingml/2006/main" xmlns:r="http://schemas.openxmlformats.org/officeDocument/2006/relationships" xmlns:ac="http://schemas.microsoft.com/office/drawing/2013/main/command" xmlns:pc="http://schemas.microsoft.com/office/powerpoint/2013/main/command">
+  <pc:docChgLst>
+    <pc:chgData name="Teichmann, Tyler" userId="75f67d8f-eece-4552-8350-86fa11f0969f" providerId="ADAL" clId="{08224E00-7537-49EA-AB15-13DE6510721C}"/>
+    <pc:docChg chg="modSld">
+      <pc:chgData name="Teichmann, Tyler" userId="75f67d8f-eece-4552-8350-86fa11f0969f" providerId="ADAL" clId="{08224E00-7537-49EA-AB15-13DE6510721C}" dt="2024-04-09T18:22:11.117" v="22" actId="20577"/>
+      <pc:docMkLst>
+        <pc:docMk/>
+      </pc:docMkLst>
+      <pc:sldChg chg="modSp">
+        <pc:chgData name="Teichmann, Tyler" userId="75f67d8f-eece-4552-8350-86fa11f0969f" providerId="ADAL" clId="{08224E00-7537-49EA-AB15-13DE6510721C}" dt="2024-04-09T18:22:11.117" v="22" actId="20577"/>
+        <pc:sldMkLst>
+          <pc:docMk/>
+          <pc:sldMk cId="1599154236" sldId="256"/>
+        </pc:sldMkLst>
+        <pc:spChg chg="mod">
+          <ac:chgData name="Teichmann, Tyler" userId="75f67d8f-eece-4552-8350-86fa11f0969f" providerId="ADAL" clId="{08224E00-7537-49EA-AB15-13DE6510721C}" dt="2024-04-09T18:22:11.117" v="22" actId="20577"/>
+          <ac:spMkLst>
+            <pc:docMk/>
+            <pc:sldMk cId="1599154236" sldId="256"/>
+            <ac:spMk id="2" creationId="{85C02251-63A8-478E-8FA6-F8BC722B085A}"/>
+          </ac:spMkLst>
+        </pc:spChg>
+      </pc:sldChg>
+    </pc:docChg>
+  </pc:docChgLst>
   <pc:docChgLst>
     <pc:chgData name="Teichmann, Tyler" userId="75f67d8f-eece-4552-8350-86fa11f0969f" providerId="ADAL" clId="{C33AE652-2C65-4559-AFD4-58354B3BFFE3}"/>
     <pc:docChg chg="custSel addSld modSld sldOrd modMainMaster">
@@ -4368,7 +4392,7 @@
           <a:p>
             <a:r>
               <a:rPr lang="en-US" dirty="0"/>
-              <a:t>TIM SORT</a:t>
+              <a:t>TIM SORT (My change to slide 1)</a:t>
             </a:r>
           </a:p>
         </p:txBody>
@@ -7648,20 +7672,20 @@
 </file>
 
 <file path=customXml/item2.xml><?xml version="1.0" encoding="utf-8"?>
-<p:properties xmlns:p="http://schemas.microsoft.com/office/2006/metadata/properties" xmlns:xsi="http://www.w3.org/2001/XMLSchema-instance" xmlns:pc="http://schemas.microsoft.com/office/infopath/2007/PartnerControls">
-  <documentManagement>
-    <_activity xmlns="bdaba121-48a8-493b-9567-a1d720e935a1" xsi:nil="true"/>
-  </documentManagement>
-</p:properties>
-</file>
-
-<file path=customXml/item3.xml><?xml version="1.0" encoding="utf-8"?>
 <?mso-contentType ?>
 <FormTemplates xmlns="http://schemas.microsoft.com/sharepoint/v3/contenttype/forms">
   <Display>DocumentLibraryForm</Display>
   <Edit>DocumentLibraryForm</Edit>
   <New>DocumentLibraryForm</New>
 </FormTemplates>
+</file>
+
+<file path=customXml/item3.xml><?xml version="1.0" encoding="utf-8"?>
+<p:properties xmlns:p="http://schemas.microsoft.com/office/2006/metadata/properties" xmlns:xsi="http://www.w3.org/2001/XMLSchema-instance" xmlns:pc="http://schemas.microsoft.com/office/infopath/2007/PartnerControls">
+  <documentManagement>
+    <_activity xmlns="bdaba121-48a8-493b-9567-a1d720e935a1" xsi:nil="true"/>
+  </documentManagement>
+</p:properties>
 </file>
 
 <file path=customXml/itemProps1.xml><?xml version="1.0" encoding="utf-8"?>
@@ -7684,26 +7708,26 @@
 </file>
 
 <file path=customXml/itemProps2.xml><?xml version="1.0" encoding="utf-8"?>
-<ds:datastoreItem xmlns:ds="http://schemas.openxmlformats.org/officeDocument/2006/customXml" ds:itemID="{5AFD10CD-42A2-464F-BCBC-377959371850}">
+<ds:datastoreItem xmlns:ds="http://schemas.openxmlformats.org/officeDocument/2006/customXml" ds:itemID="{E133C991-2001-4127-8C22-801161A4C08A}">
   <ds:schemaRefs>
-    <ds:schemaRef ds:uri="http://purl.org/dc/dcmitype/"/>
-    <ds:schemaRef ds:uri="http://purl.org/dc/terms/"/>
-    <ds:schemaRef ds:uri="44d0fcd2-d1a2-45cc-9eab-0eaaa8027c1b"/>
-    <ds:schemaRef ds:uri="http://schemas.openxmlformats.org/package/2006/metadata/core-properties"/>
-    <ds:schemaRef ds:uri="http://www.w3.org/XML/1998/namespace"/>
-    <ds:schemaRef ds:uri="http://schemas.microsoft.com/office/2006/documentManagement/types"/>
-    <ds:schemaRef ds:uri="http://purl.org/dc/elements/1.1/"/>
-    <ds:schemaRef ds:uri="http://schemas.microsoft.com/office/infopath/2007/PartnerControls"/>
-    <ds:schemaRef ds:uri="bdaba121-48a8-493b-9567-a1d720e935a1"/>
-    <ds:schemaRef ds:uri="http://schemas.microsoft.com/office/2006/metadata/properties"/>
+    <ds:schemaRef ds:uri="http://schemas.microsoft.com/sharepoint/v3/contenttype/forms"/>
   </ds:schemaRefs>
 </ds:datastoreItem>
 </file>
 
 <file path=customXml/itemProps3.xml><?xml version="1.0" encoding="utf-8"?>
-<ds:datastoreItem xmlns:ds="http://schemas.openxmlformats.org/officeDocument/2006/customXml" ds:itemID="{E133C991-2001-4127-8C22-801161A4C08A}">
+<ds:datastoreItem xmlns:ds="http://schemas.openxmlformats.org/officeDocument/2006/customXml" ds:itemID="{5AFD10CD-42A2-464F-BCBC-377959371850}">
   <ds:schemaRefs>
-    <ds:schemaRef ds:uri="http://schemas.microsoft.com/sharepoint/v3/contenttype/forms"/>
+    <ds:schemaRef ds:uri="http://purl.org/dc/elements/1.1/"/>
+    <ds:schemaRef ds:uri="http://schemas.microsoft.com/office/2006/documentManagement/types"/>
+    <ds:schemaRef ds:uri="bdaba121-48a8-493b-9567-a1d720e935a1"/>
+    <ds:schemaRef ds:uri="http://purl.org/dc/terms/"/>
+    <ds:schemaRef ds:uri="http://schemas.microsoft.com/office/infopath/2007/PartnerControls"/>
+    <ds:schemaRef ds:uri="http://schemas.openxmlformats.org/package/2006/metadata/core-properties"/>
+    <ds:schemaRef ds:uri="http://purl.org/dc/dcmitype/"/>
+    <ds:schemaRef ds:uri="44d0fcd2-d1a2-45cc-9eab-0eaaa8027c1b"/>
+    <ds:schemaRef ds:uri="http://schemas.microsoft.com/office/2006/metadata/properties"/>
+    <ds:schemaRef ds:uri="http://www.w3.org/XML/1998/namespace"/>
   </ds:schemaRefs>
 </ds:datastoreItem>
 </file>
</xml_diff>

<commit_message>
added timsort complexity graph
</commit_message>
<xml_diff>
--- a/Tim-Sort-Presentation.pptx
+++ b/Tim-Sort-Presentation.pptx
@@ -4459,32 +4459,1239 @@
           <a:bodyPr/>
           <a:lstStyle/>
           <a:p>
-            <a:endParaRPr lang="en-US"/>
-          </a:p>
-        </p:txBody>
-      </p:sp>
-      <p:sp>
-        <p:nvSpPr>
-          <p:cNvPr id="5" name="Content Placeholder 4">
-            <a:extLst>
-              <a:ext uri="{FF2B5EF4-FFF2-40B4-BE49-F238E27FC236}">
-                <a16:creationId xmlns:a16="http://schemas.microsoft.com/office/drawing/2014/main" id="{582B29E0-1EE9-4F46-925C-2766D92FB555}"/>
-              </a:ext>
-            </a:extLst>
-          </p:cNvPr>
-          <p:cNvSpPr>
-            <a:spLocks noGrp="1"/>
-          </p:cNvSpPr>
+            <a:r>
+              <a:rPr lang="en-US" dirty="0" err="1"/>
+              <a:t>Timsort</a:t>
+            </a:r>
+            <a:r>
+              <a:rPr lang="en-US" dirty="0"/>
+              <a:t> Complexity Analysis:</a:t>
+            </a:r>
+          </a:p>
+        </p:txBody>
+      </p:sp>
+      <p:graphicFrame>
+        <p:nvGraphicFramePr>
+          <p:cNvPr id="2" name="Content Placeholder 1">
+            <a:extLst>
+              <a:ext uri="{FF2B5EF4-FFF2-40B4-BE49-F238E27FC236}">
+                <a16:creationId xmlns:a16="http://schemas.microsoft.com/office/drawing/2014/main" id="{32E3AE4C-5DC6-4D89-88DC-1F663F21EFA6}"/>
+              </a:ext>
+            </a:extLst>
+          </p:cNvPr>
+          <p:cNvGraphicFramePr>
+            <a:graphicFrameLocks noGrp="1"/>
+          </p:cNvGraphicFramePr>
           <p:nvPr>
             <p:ph idx="1"/>
           </p:nvPr>
-        </p:nvSpPr>
-        <p:spPr/>
-        <p:txBody>
-          <a:bodyPr/>
+        </p:nvGraphicFramePr>
+        <p:xfrm>
+          <a:off x="838200" y="2389537"/>
+          <a:ext cx="10515600" cy="3223514"/>
+        </p:xfrm>
+        <a:graphic>
+          <a:graphicData uri="http://schemas.openxmlformats.org/drawingml/2006/table">
+            <a:tbl>
+              <a:tblPr firstRow="1" firstCol="1" bandRow="1"/>
+              <a:tblGrid>
+                <a:gridCol w="3364992">
+                  <a:extLst>
+                    <a:ext uri="{9D8B030D-6E8A-4147-A177-3AD203B41FA5}">
+                      <a16:colId xmlns:a16="http://schemas.microsoft.com/office/drawing/2014/main" val="1089200619"/>
+                    </a:ext>
+                  </a:extLst>
+                </a:gridCol>
+                <a:gridCol w="7150608">
+                  <a:extLst>
+                    <a:ext uri="{9D8B030D-6E8A-4147-A177-3AD203B41FA5}">
+                      <a16:colId xmlns:a16="http://schemas.microsoft.com/office/drawing/2014/main" val="2248377849"/>
+                    </a:ext>
+                  </a:extLst>
+                </a:gridCol>
+              </a:tblGrid>
+              <a:tr h="0">
+                <a:tc>
+                  <a:txBody>
+                    <a:bodyPr/>
+                    <a:lstStyle/>
+                    <a:p>
+                      <a:pPr marL="0" marR="0" algn="ctr" fontAlgn="base">
+                        <a:lnSpc>
+                          <a:spcPct val="107000"/>
+                        </a:lnSpc>
+                        <a:spcBef>
+                          <a:spcPts val="0"/>
+                        </a:spcBef>
+                        <a:spcAft>
+                          <a:spcPts val="0"/>
+                        </a:spcAft>
+                      </a:pPr>
+                      <a:r>
+                        <a:rPr lang="en-US" sz="1300" b="1">
+                          <a:effectLst/>
+                          <a:latin typeface="Times New Roman" panose="02020603050405020304" pitchFamily="18" charset="0"/>
+                          <a:ea typeface="Times New Roman" panose="02020603050405020304" pitchFamily="18" charset="0"/>
+                          <a:cs typeface="Times New Roman" panose="02020603050405020304" pitchFamily="18" charset="0"/>
+                        </a:rPr>
+                        <a:t>Case</a:t>
+                      </a:r>
+                      <a:endParaRPr lang="en-US" sz="1100">
+                        <a:effectLst/>
+                        <a:latin typeface="Calibri" panose="020F0502020204030204" pitchFamily="34" charset="0"/>
+                        <a:ea typeface="Calibri" panose="020F0502020204030204" pitchFamily="34" charset="0"/>
+                        <a:cs typeface="Times New Roman" panose="02020603050405020304" pitchFamily="18" charset="0"/>
+                      </a:endParaRPr>
+                    </a:p>
+                  </a:txBody>
+                  <a:tcPr marL="38100" marR="38100" marT="36195" marB="36195" anchor="b">
+                    <a:lnL w="12700" cap="flat" cmpd="sng" algn="ctr">
+                      <a:solidFill>
+                        <a:srgbClr val="DFDFDF"/>
+                      </a:solidFill>
+                      <a:prstDash val="solid"/>
+                      <a:round/>
+                      <a:headEnd type="none" w="med" len="med"/>
+                      <a:tailEnd type="none" w="med" len="med"/>
+                    </a:lnL>
+                    <a:lnR w="12700" cap="flat" cmpd="sng" algn="ctr">
+                      <a:solidFill>
+                        <a:srgbClr val="DFDFDF"/>
+                      </a:solidFill>
+                      <a:prstDash val="solid"/>
+                      <a:round/>
+                      <a:headEnd type="none" w="med" len="med"/>
+                      <a:tailEnd type="none" w="med" len="med"/>
+                    </a:lnR>
+                    <a:lnT w="12700" cap="flat" cmpd="sng" algn="ctr">
+                      <a:solidFill>
+                        <a:srgbClr val="DFDFDF"/>
+                      </a:solidFill>
+                      <a:prstDash val="solid"/>
+                      <a:round/>
+                      <a:headEnd type="none" w="med" len="med"/>
+                      <a:tailEnd type="none" w="med" len="med"/>
+                    </a:lnT>
+                    <a:lnB w="12700" cap="flat" cmpd="sng" algn="ctr">
+                      <a:solidFill>
+                        <a:srgbClr val="DFDFDF"/>
+                      </a:solidFill>
+                      <a:prstDash val="solid"/>
+                      <a:round/>
+                      <a:headEnd type="none" w="med" len="med"/>
+                      <a:tailEnd type="none" w="med" len="med"/>
+                    </a:lnB>
+                  </a:tcPr>
+                </a:tc>
+                <a:tc>
+                  <a:txBody>
+                    <a:bodyPr/>
+                    <a:lstStyle/>
+                    <a:p>
+                      <a:pPr marL="0" marR="0" algn="ctr" fontAlgn="base">
+                        <a:lnSpc>
+                          <a:spcPct val="107000"/>
+                        </a:lnSpc>
+                        <a:spcBef>
+                          <a:spcPts val="0"/>
+                        </a:spcBef>
+                        <a:spcAft>
+                          <a:spcPts val="0"/>
+                        </a:spcAft>
+                      </a:pPr>
+                      <a:r>
+                        <a:rPr lang="en-US" sz="1250" b="1">
+                          <a:effectLst/>
+                          <a:latin typeface="Times New Roman" panose="02020603050405020304" pitchFamily="18" charset="0"/>
+                          <a:ea typeface="Times New Roman" panose="02020603050405020304" pitchFamily="18" charset="0"/>
+                          <a:cs typeface="Times New Roman" panose="02020603050405020304" pitchFamily="18" charset="0"/>
+                        </a:rPr>
+                        <a:t>Complexity</a:t>
+                      </a:r>
+                      <a:endParaRPr lang="en-US" sz="1100">
+                        <a:effectLst/>
+                        <a:latin typeface="Calibri" panose="020F0502020204030204" pitchFamily="34" charset="0"/>
+                        <a:ea typeface="Calibri" panose="020F0502020204030204" pitchFamily="34" charset="0"/>
+                        <a:cs typeface="Times New Roman" panose="02020603050405020304" pitchFamily="18" charset="0"/>
+                      </a:endParaRPr>
+                    </a:p>
+                  </a:txBody>
+                  <a:tcPr marL="95250" marR="95250" marT="133350" marB="133350" anchor="ctr">
+                    <a:lnL w="12700" cap="flat" cmpd="sng" algn="ctr">
+                      <a:solidFill>
+                        <a:srgbClr val="DFDFDF"/>
+                      </a:solidFill>
+                      <a:prstDash val="solid"/>
+                      <a:round/>
+                      <a:headEnd type="none" w="med" len="med"/>
+                      <a:tailEnd type="none" w="med" len="med"/>
+                    </a:lnL>
+                    <a:lnR w="12700" cap="flat" cmpd="sng" algn="ctr">
+                      <a:solidFill>
+                        <a:srgbClr val="DFDFDF"/>
+                      </a:solidFill>
+                      <a:prstDash val="solid"/>
+                      <a:round/>
+                      <a:headEnd type="none" w="med" len="med"/>
+                      <a:tailEnd type="none" w="med" len="med"/>
+                    </a:lnR>
+                    <a:lnT w="12700" cap="flat" cmpd="sng" algn="ctr">
+                      <a:solidFill>
+                        <a:srgbClr val="DFDFDF"/>
+                      </a:solidFill>
+                      <a:prstDash val="solid"/>
+                      <a:round/>
+                      <a:headEnd type="none" w="med" len="med"/>
+                      <a:tailEnd type="none" w="med" len="med"/>
+                    </a:lnT>
+                    <a:lnB w="12700" cap="flat" cmpd="sng" algn="ctr">
+                      <a:solidFill>
+                        <a:srgbClr val="DFDFDF"/>
+                      </a:solidFill>
+                      <a:prstDash val="solid"/>
+                      <a:round/>
+                      <a:headEnd type="none" w="med" len="med"/>
+                      <a:tailEnd type="none" w="med" len="med"/>
+                    </a:lnB>
+                  </a:tcPr>
+                </a:tc>
+                <a:extLst>
+                  <a:ext uri="{0D108BD9-81ED-4DB2-BD59-A6C34878D82A}">
+                    <a16:rowId xmlns:a16="http://schemas.microsoft.com/office/drawing/2014/main" val="538089880"/>
+                  </a:ext>
+                </a:extLst>
+              </a:tr>
+              <a:tr h="0">
+                <a:tc>
+                  <a:txBody>
+                    <a:bodyPr/>
+                    <a:lstStyle/>
+                    <a:p>
+                      <a:pPr marL="0" marR="0" algn="ctr" fontAlgn="base">
+                        <a:lnSpc>
+                          <a:spcPct val="107000"/>
+                        </a:lnSpc>
+                        <a:spcBef>
+                          <a:spcPts val="0"/>
+                        </a:spcBef>
+                        <a:spcAft>
+                          <a:spcPts val="750"/>
+                        </a:spcAft>
+                      </a:pPr>
+                      <a:r>
+                        <a:rPr lang="en-US" sz="1300" b="1">
+                          <a:effectLst/>
+                          <a:latin typeface="Times New Roman" panose="02020603050405020304" pitchFamily="18" charset="0"/>
+                          <a:ea typeface="Times New Roman" panose="02020603050405020304" pitchFamily="18" charset="0"/>
+                          <a:cs typeface="Times New Roman" panose="02020603050405020304" pitchFamily="18" charset="0"/>
+                        </a:rPr>
+                        <a:t>Best Case</a:t>
+                      </a:r>
+                      <a:endParaRPr lang="en-US" sz="1100">
+                        <a:effectLst/>
+                        <a:latin typeface="Calibri" panose="020F0502020204030204" pitchFamily="34" charset="0"/>
+                        <a:ea typeface="Calibri" panose="020F0502020204030204" pitchFamily="34" charset="0"/>
+                        <a:cs typeface="Times New Roman" panose="02020603050405020304" pitchFamily="18" charset="0"/>
+                      </a:endParaRPr>
+                    </a:p>
+                  </a:txBody>
+                  <a:tcPr marL="38100" marR="38100" marT="36195" marB="36195" anchor="b">
+                    <a:lnL w="12700" cap="flat" cmpd="sng" algn="ctr">
+                      <a:solidFill>
+                        <a:srgbClr val="DFDFDF"/>
+                      </a:solidFill>
+                      <a:prstDash val="solid"/>
+                      <a:round/>
+                      <a:headEnd type="none" w="med" len="med"/>
+                      <a:tailEnd type="none" w="med" len="med"/>
+                    </a:lnL>
+                    <a:lnR w="12700" cap="flat" cmpd="sng" algn="ctr">
+                      <a:solidFill>
+                        <a:srgbClr val="DFDFDF"/>
+                      </a:solidFill>
+                      <a:prstDash val="solid"/>
+                      <a:round/>
+                      <a:headEnd type="none" w="med" len="med"/>
+                      <a:tailEnd type="none" w="med" len="med"/>
+                    </a:lnR>
+                    <a:lnT w="12700" cap="flat" cmpd="sng" algn="ctr">
+                      <a:solidFill>
+                        <a:srgbClr val="DFDFDF"/>
+                      </a:solidFill>
+                      <a:prstDash val="solid"/>
+                      <a:round/>
+                      <a:headEnd type="none" w="med" len="med"/>
+                      <a:tailEnd type="none" w="med" len="med"/>
+                    </a:lnT>
+                    <a:lnB w="12700" cap="flat" cmpd="sng" algn="ctr">
+                      <a:solidFill>
+                        <a:srgbClr val="DFDFDF"/>
+                      </a:solidFill>
+                      <a:prstDash val="solid"/>
+                      <a:round/>
+                      <a:headEnd type="none" w="med" len="med"/>
+                      <a:tailEnd type="none" w="med" len="med"/>
+                    </a:lnB>
+                  </a:tcPr>
+                </a:tc>
+                <a:tc>
+                  <a:txBody>
+                    <a:bodyPr/>
+                    <a:lstStyle/>
+                    <a:p>
+                      <a:pPr marL="0" marR="0" algn="ctr" fontAlgn="base">
+                        <a:lnSpc>
+                          <a:spcPct val="107000"/>
+                        </a:lnSpc>
+                        <a:spcBef>
+                          <a:spcPts val="0"/>
+                        </a:spcBef>
+                        <a:spcAft>
+                          <a:spcPts val="750"/>
+                        </a:spcAft>
+                      </a:pPr>
+                      <a:r>
+                        <a:rPr lang="en-US" sz="1250">
+                          <a:effectLst/>
+                          <a:latin typeface="Times New Roman" panose="02020603050405020304" pitchFamily="18" charset="0"/>
+                          <a:ea typeface="Times New Roman" panose="02020603050405020304" pitchFamily="18" charset="0"/>
+                          <a:cs typeface="Times New Roman" panose="02020603050405020304" pitchFamily="18" charset="0"/>
+                        </a:rPr>
+                        <a:t>O(n)</a:t>
+                      </a:r>
+                      <a:endParaRPr lang="en-US" sz="1100">
+                        <a:effectLst/>
+                        <a:latin typeface="Calibri" panose="020F0502020204030204" pitchFamily="34" charset="0"/>
+                        <a:ea typeface="Calibri" panose="020F0502020204030204" pitchFamily="34" charset="0"/>
+                        <a:cs typeface="Times New Roman" panose="02020603050405020304" pitchFamily="18" charset="0"/>
+                      </a:endParaRPr>
+                    </a:p>
+                  </a:txBody>
+                  <a:tcPr marL="95250" marR="95250" marT="133350" marB="133350" anchor="ctr">
+                    <a:lnL w="12700" cap="flat" cmpd="sng" algn="ctr">
+                      <a:solidFill>
+                        <a:srgbClr val="DFDFDF"/>
+                      </a:solidFill>
+                      <a:prstDash val="solid"/>
+                      <a:round/>
+                      <a:headEnd type="none" w="med" len="med"/>
+                      <a:tailEnd type="none" w="med" len="med"/>
+                    </a:lnL>
+                    <a:lnR w="12700" cap="flat" cmpd="sng" algn="ctr">
+                      <a:solidFill>
+                        <a:srgbClr val="DFDFDF"/>
+                      </a:solidFill>
+                      <a:prstDash val="solid"/>
+                      <a:round/>
+                      <a:headEnd type="none" w="med" len="med"/>
+                      <a:tailEnd type="none" w="med" len="med"/>
+                    </a:lnR>
+                    <a:lnT w="12700" cap="flat" cmpd="sng" algn="ctr">
+                      <a:solidFill>
+                        <a:srgbClr val="DFDFDF"/>
+                      </a:solidFill>
+                      <a:prstDash val="solid"/>
+                      <a:round/>
+                      <a:headEnd type="none" w="med" len="med"/>
+                      <a:tailEnd type="none" w="med" len="med"/>
+                    </a:lnT>
+                    <a:lnB w="12700" cap="flat" cmpd="sng" algn="ctr">
+                      <a:solidFill>
+                        <a:srgbClr val="DFDFDF"/>
+                      </a:solidFill>
+                      <a:prstDash val="solid"/>
+                      <a:round/>
+                      <a:headEnd type="none" w="med" len="med"/>
+                      <a:tailEnd type="none" w="med" len="med"/>
+                    </a:lnB>
+                  </a:tcPr>
+                </a:tc>
+                <a:extLst>
+                  <a:ext uri="{0D108BD9-81ED-4DB2-BD59-A6C34878D82A}">
+                    <a16:rowId xmlns:a16="http://schemas.microsoft.com/office/drawing/2014/main" val="4019131703"/>
+                  </a:ext>
+                </a:extLst>
+              </a:tr>
+              <a:tr h="0">
+                <a:tc>
+                  <a:txBody>
+                    <a:bodyPr/>
+                    <a:lstStyle/>
+                    <a:p>
+                      <a:pPr marL="0" marR="0" algn="ctr" fontAlgn="base">
+                        <a:lnSpc>
+                          <a:spcPct val="107000"/>
+                        </a:lnSpc>
+                        <a:spcBef>
+                          <a:spcPts val="0"/>
+                        </a:spcBef>
+                        <a:spcAft>
+                          <a:spcPts val="750"/>
+                        </a:spcAft>
+                      </a:pPr>
+                      <a:r>
+                        <a:rPr lang="en-US" sz="1300" b="1">
+                          <a:effectLst/>
+                          <a:latin typeface="Times New Roman" panose="02020603050405020304" pitchFamily="18" charset="0"/>
+                          <a:ea typeface="Times New Roman" panose="02020603050405020304" pitchFamily="18" charset="0"/>
+                          <a:cs typeface="Times New Roman" panose="02020603050405020304" pitchFamily="18" charset="0"/>
+                        </a:rPr>
+                        <a:t>Average Case</a:t>
+                      </a:r>
+                      <a:endParaRPr lang="en-US" sz="1100">
+                        <a:effectLst/>
+                        <a:latin typeface="Calibri" panose="020F0502020204030204" pitchFamily="34" charset="0"/>
+                        <a:ea typeface="Calibri" panose="020F0502020204030204" pitchFamily="34" charset="0"/>
+                        <a:cs typeface="Times New Roman" panose="02020603050405020304" pitchFamily="18" charset="0"/>
+                      </a:endParaRPr>
+                    </a:p>
+                  </a:txBody>
+                  <a:tcPr marL="38100" marR="38100" marT="36195" marB="36195" anchor="b">
+                    <a:lnL w="12700" cap="flat" cmpd="sng" algn="ctr">
+                      <a:solidFill>
+                        <a:srgbClr val="DFDFDF"/>
+                      </a:solidFill>
+                      <a:prstDash val="solid"/>
+                      <a:round/>
+                      <a:headEnd type="none" w="med" len="med"/>
+                      <a:tailEnd type="none" w="med" len="med"/>
+                    </a:lnL>
+                    <a:lnR w="12700" cap="flat" cmpd="sng" algn="ctr">
+                      <a:solidFill>
+                        <a:srgbClr val="DFDFDF"/>
+                      </a:solidFill>
+                      <a:prstDash val="solid"/>
+                      <a:round/>
+                      <a:headEnd type="none" w="med" len="med"/>
+                      <a:tailEnd type="none" w="med" len="med"/>
+                    </a:lnR>
+                    <a:lnT w="12700" cap="flat" cmpd="sng" algn="ctr">
+                      <a:solidFill>
+                        <a:srgbClr val="DFDFDF"/>
+                      </a:solidFill>
+                      <a:prstDash val="solid"/>
+                      <a:round/>
+                      <a:headEnd type="none" w="med" len="med"/>
+                      <a:tailEnd type="none" w="med" len="med"/>
+                    </a:lnT>
+                    <a:lnB w="12700" cap="flat" cmpd="sng" algn="ctr">
+                      <a:solidFill>
+                        <a:srgbClr val="DFDFDF"/>
+                      </a:solidFill>
+                      <a:prstDash val="solid"/>
+                      <a:round/>
+                      <a:headEnd type="none" w="med" len="med"/>
+                      <a:tailEnd type="none" w="med" len="med"/>
+                    </a:lnB>
+                  </a:tcPr>
+                </a:tc>
+                <a:tc>
+                  <a:txBody>
+                    <a:bodyPr/>
+                    <a:lstStyle/>
+                    <a:p>
+                      <a:pPr marL="0" marR="0" algn="ctr" fontAlgn="base">
+                        <a:lnSpc>
+                          <a:spcPct val="107000"/>
+                        </a:lnSpc>
+                        <a:spcBef>
+                          <a:spcPts val="0"/>
+                        </a:spcBef>
+                        <a:spcAft>
+                          <a:spcPts val="750"/>
+                        </a:spcAft>
+                      </a:pPr>
+                      <a:r>
+                        <a:rPr lang="en-US" sz="1250">
+                          <a:effectLst/>
+                          <a:latin typeface="Times New Roman" panose="02020603050405020304" pitchFamily="18" charset="0"/>
+                          <a:ea typeface="Times New Roman" panose="02020603050405020304" pitchFamily="18" charset="0"/>
+                          <a:cs typeface="Times New Roman" panose="02020603050405020304" pitchFamily="18" charset="0"/>
+                        </a:rPr>
+                        <a:t>O(n*log(n))</a:t>
+                      </a:r>
+                      <a:endParaRPr lang="en-US" sz="1100">
+                        <a:effectLst/>
+                        <a:latin typeface="Calibri" panose="020F0502020204030204" pitchFamily="34" charset="0"/>
+                        <a:ea typeface="Calibri" panose="020F0502020204030204" pitchFamily="34" charset="0"/>
+                        <a:cs typeface="Times New Roman" panose="02020603050405020304" pitchFamily="18" charset="0"/>
+                      </a:endParaRPr>
+                    </a:p>
+                  </a:txBody>
+                  <a:tcPr marL="95250" marR="95250" marT="133350" marB="133350" anchor="ctr">
+                    <a:lnL w="12700" cap="flat" cmpd="sng" algn="ctr">
+                      <a:solidFill>
+                        <a:srgbClr val="DFDFDF"/>
+                      </a:solidFill>
+                      <a:prstDash val="solid"/>
+                      <a:round/>
+                      <a:headEnd type="none" w="med" len="med"/>
+                      <a:tailEnd type="none" w="med" len="med"/>
+                    </a:lnL>
+                    <a:lnR w="12700" cap="flat" cmpd="sng" algn="ctr">
+                      <a:solidFill>
+                        <a:srgbClr val="DFDFDF"/>
+                      </a:solidFill>
+                      <a:prstDash val="solid"/>
+                      <a:round/>
+                      <a:headEnd type="none" w="med" len="med"/>
+                      <a:tailEnd type="none" w="med" len="med"/>
+                    </a:lnR>
+                    <a:lnT w="12700" cap="flat" cmpd="sng" algn="ctr">
+                      <a:solidFill>
+                        <a:srgbClr val="DFDFDF"/>
+                      </a:solidFill>
+                      <a:prstDash val="solid"/>
+                      <a:round/>
+                      <a:headEnd type="none" w="med" len="med"/>
+                      <a:tailEnd type="none" w="med" len="med"/>
+                    </a:lnT>
+                    <a:lnB w="12700" cap="flat" cmpd="sng" algn="ctr">
+                      <a:solidFill>
+                        <a:srgbClr val="DFDFDF"/>
+                      </a:solidFill>
+                      <a:prstDash val="solid"/>
+                      <a:round/>
+                      <a:headEnd type="none" w="med" len="med"/>
+                      <a:tailEnd type="none" w="med" len="med"/>
+                    </a:lnB>
+                  </a:tcPr>
+                </a:tc>
+                <a:extLst>
+                  <a:ext uri="{0D108BD9-81ED-4DB2-BD59-A6C34878D82A}">
+                    <a16:rowId xmlns:a16="http://schemas.microsoft.com/office/drawing/2014/main" val="943570844"/>
+                  </a:ext>
+                </a:extLst>
+              </a:tr>
+              <a:tr h="0">
+                <a:tc>
+                  <a:txBody>
+                    <a:bodyPr/>
+                    <a:lstStyle/>
+                    <a:p>
+                      <a:pPr marL="0" marR="0" algn="ctr" fontAlgn="base">
+                        <a:lnSpc>
+                          <a:spcPct val="107000"/>
+                        </a:lnSpc>
+                        <a:spcBef>
+                          <a:spcPts val="0"/>
+                        </a:spcBef>
+                        <a:spcAft>
+                          <a:spcPts val="750"/>
+                        </a:spcAft>
+                      </a:pPr>
+                      <a:r>
+                        <a:rPr lang="en-US" sz="1300" b="1">
+                          <a:effectLst/>
+                          <a:latin typeface="Times New Roman" panose="02020603050405020304" pitchFamily="18" charset="0"/>
+                          <a:ea typeface="Times New Roman" panose="02020603050405020304" pitchFamily="18" charset="0"/>
+                          <a:cs typeface="Times New Roman" panose="02020603050405020304" pitchFamily="18" charset="0"/>
+                        </a:rPr>
+                        <a:t>Worst Case</a:t>
+                      </a:r>
+                      <a:endParaRPr lang="en-US" sz="1100">
+                        <a:effectLst/>
+                        <a:latin typeface="Calibri" panose="020F0502020204030204" pitchFamily="34" charset="0"/>
+                        <a:ea typeface="Calibri" panose="020F0502020204030204" pitchFamily="34" charset="0"/>
+                        <a:cs typeface="Times New Roman" panose="02020603050405020304" pitchFamily="18" charset="0"/>
+                      </a:endParaRPr>
+                    </a:p>
+                  </a:txBody>
+                  <a:tcPr marL="38100" marR="38100" marT="36195" marB="36195" anchor="b">
+                    <a:lnL w="12700" cap="flat" cmpd="sng" algn="ctr">
+                      <a:solidFill>
+                        <a:srgbClr val="DFDFDF"/>
+                      </a:solidFill>
+                      <a:prstDash val="solid"/>
+                      <a:round/>
+                      <a:headEnd type="none" w="med" len="med"/>
+                      <a:tailEnd type="none" w="med" len="med"/>
+                    </a:lnL>
+                    <a:lnR w="12700" cap="flat" cmpd="sng" algn="ctr">
+                      <a:solidFill>
+                        <a:srgbClr val="DFDFDF"/>
+                      </a:solidFill>
+                      <a:prstDash val="solid"/>
+                      <a:round/>
+                      <a:headEnd type="none" w="med" len="med"/>
+                      <a:tailEnd type="none" w="med" len="med"/>
+                    </a:lnR>
+                    <a:lnT w="12700" cap="flat" cmpd="sng" algn="ctr">
+                      <a:solidFill>
+                        <a:srgbClr val="DFDFDF"/>
+                      </a:solidFill>
+                      <a:prstDash val="solid"/>
+                      <a:round/>
+                      <a:headEnd type="none" w="med" len="med"/>
+                      <a:tailEnd type="none" w="med" len="med"/>
+                    </a:lnT>
+                    <a:lnB w="12700" cap="flat" cmpd="sng" algn="ctr">
+                      <a:solidFill>
+                        <a:srgbClr val="DFDFDF"/>
+                      </a:solidFill>
+                      <a:prstDash val="solid"/>
+                      <a:round/>
+                      <a:headEnd type="none" w="med" len="med"/>
+                      <a:tailEnd type="none" w="med" len="med"/>
+                    </a:lnB>
+                  </a:tcPr>
+                </a:tc>
+                <a:tc>
+                  <a:txBody>
+                    <a:bodyPr/>
+                    <a:lstStyle/>
+                    <a:p>
+                      <a:pPr marL="0" marR="0" algn="ctr" fontAlgn="base">
+                        <a:lnSpc>
+                          <a:spcPct val="107000"/>
+                        </a:lnSpc>
+                        <a:spcBef>
+                          <a:spcPts val="0"/>
+                        </a:spcBef>
+                        <a:spcAft>
+                          <a:spcPts val="750"/>
+                        </a:spcAft>
+                      </a:pPr>
+                      <a:r>
+                        <a:rPr lang="en-US" sz="1250">
+                          <a:effectLst/>
+                          <a:latin typeface="Times New Roman" panose="02020603050405020304" pitchFamily="18" charset="0"/>
+                          <a:ea typeface="Times New Roman" panose="02020603050405020304" pitchFamily="18" charset="0"/>
+                          <a:cs typeface="Times New Roman" panose="02020603050405020304" pitchFamily="18" charset="0"/>
+                        </a:rPr>
+                        <a:t>O(n*log(n))</a:t>
+                      </a:r>
+                      <a:endParaRPr lang="en-US" sz="1100">
+                        <a:effectLst/>
+                        <a:latin typeface="Calibri" panose="020F0502020204030204" pitchFamily="34" charset="0"/>
+                        <a:ea typeface="Calibri" panose="020F0502020204030204" pitchFamily="34" charset="0"/>
+                        <a:cs typeface="Times New Roman" panose="02020603050405020304" pitchFamily="18" charset="0"/>
+                      </a:endParaRPr>
+                    </a:p>
+                  </a:txBody>
+                  <a:tcPr marL="95250" marR="95250" marT="133350" marB="133350" anchor="ctr">
+                    <a:lnL w="12700" cap="flat" cmpd="sng" algn="ctr">
+                      <a:solidFill>
+                        <a:srgbClr val="DFDFDF"/>
+                      </a:solidFill>
+                      <a:prstDash val="solid"/>
+                      <a:round/>
+                      <a:headEnd type="none" w="med" len="med"/>
+                      <a:tailEnd type="none" w="med" len="med"/>
+                    </a:lnL>
+                    <a:lnR w="12700" cap="flat" cmpd="sng" algn="ctr">
+                      <a:solidFill>
+                        <a:srgbClr val="DFDFDF"/>
+                      </a:solidFill>
+                      <a:prstDash val="solid"/>
+                      <a:round/>
+                      <a:headEnd type="none" w="med" len="med"/>
+                      <a:tailEnd type="none" w="med" len="med"/>
+                    </a:lnR>
+                    <a:lnT w="12700" cap="flat" cmpd="sng" algn="ctr">
+                      <a:solidFill>
+                        <a:srgbClr val="DFDFDF"/>
+                      </a:solidFill>
+                      <a:prstDash val="solid"/>
+                      <a:round/>
+                      <a:headEnd type="none" w="med" len="med"/>
+                      <a:tailEnd type="none" w="med" len="med"/>
+                    </a:lnT>
+                    <a:lnB w="12700" cap="flat" cmpd="sng" algn="ctr">
+                      <a:solidFill>
+                        <a:srgbClr val="DFDFDF"/>
+                      </a:solidFill>
+                      <a:prstDash val="solid"/>
+                      <a:round/>
+                      <a:headEnd type="none" w="med" len="med"/>
+                      <a:tailEnd type="none" w="med" len="med"/>
+                    </a:lnB>
+                  </a:tcPr>
+                </a:tc>
+                <a:extLst>
+                  <a:ext uri="{0D108BD9-81ED-4DB2-BD59-A6C34878D82A}">
+                    <a16:rowId xmlns:a16="http://schemas.microsoft.com/office/drawing/2014/main" val="940858129"/>
+                  </a:ext>
+                </a:extLst>
+              </a:tr>
+              <a:tr h="0">
+                <a:tc>
+                  <a:txBody>
+                    <a:bodyPr/>
+                    <a:lstStyle/>
+                    <a:p>
+                      <a:pPr marL="0" marR="0" algn="ctr" fontAlgn="base">
+                        <a:lnSpc>
+                          <a:spcPct val="107000"/>
+                        </a:lnSpc>
+                        <a:spcBef>
+                          <a:spcPts val="0"/>
+                        </a:spcBef>
+                        <a:spcAft>
+                          <a:spcPts val="750"/>
+                        </a:spcAft>
+                      </a:pPr>
+                      <a:r>
+                        <a:rPr lang="en-US" sz="1300" b="1">
+                          <a:effectLst/>
+                          <a:latin typeface="Times New Roman" panose="02020603050405020304" pitchFamily="18" charset="0"/>
+                          <a:ea typeface="Times New Roman" panose="02020603050405020304" pitchFamily="18" charset="0"/>
+                          <a:cs typeface="Times New Roman" panose="02020603050405020304" pitchFamily="18" charset="0"/>
+                        </a:rPr>
+                        <a:t>Space</a:t>
+                      </a:r>
+                      <a:endParaRPr lang="en-US" sz="1100">
+                        <a:effectLst/>
+                        <a:latin typeface="Calibri" panose="020F0502020204030204" pitchFamily="34" charset="0"/>
+                        <a:ea typeface="Calibri" panose="020F0502020204030204" pitchFamily="34" charset="0"/>
+                        <a:cs typeface="Times New Roman" panose="02020603050405020304" pitchFamily="18" charset="0"/>
+                      </a:endParaRPr>
+                    </a:p>
+                  </a:txBody>
+                  <a:tcPr marL="38100" marR="38100" marT="36195" marB="36195" anchor="b">
+                    <a:lnL w="12700" cap="flat" cmpd="sng" algn="ctr">
+                      <a:solidFill>
+                        <a:srgbClr val="DFDFDF"/>
+                      </a:solidFill>
+                      <a:prstDash val="solid"/>
+                      <a:round/>
+                      <a:headEnd type="none" w="med" len="med"/>
+                      <a:tailEnd type="none" w="med" len="med"/>
+                    </a:lnL>
+                    <a:lnR w="12700" cap="flat" cmpd="sng" algn="ctr">
+                      <a:solidFill>
+                        <a:srgbClr val="DFDFDF"/>
+                      </a:solidFill>
+                      <a:prstDash val="solid"/>
+                      <a:round/>
+                      <a:headEnd type="none" w="med" len="med"/>
+                      <a:tailEnd type="none" w="med" len="med"/>
+                    </a:lnR>
+                    <a:lnT w="12700" cap="flat" cmpd="sng" algn="ctr">
+                      <a:solidFill>
+                        <a:srgbClr val="DFDFDF"/>
+                      </a:solidFill>
+                      <a:prstDash val="solid"/>
+                      <a:round/>
+                      <a:headEnd type="none" w="med" len="med"/>
+                      <a:tailEnd type="none" w="med" len="med"/>
+                    </a:lnT>
+                    <a:lnB w="12700" cap="flat" cmpd="sng" algn="ctr">
+                      <a:solidFill>
+                        <a:srgbClr val="DFDFDF"/>
+                      </a:solidFill>
+                      <a:prstDash val="solid"/>
+                      <a:round/>
+                      <a:headEnd type="none" w="med" len="med"/>
+                      <a:tailEnd type="none" w="med" len="med"/>
+                    </a:lnB>
+                  </a:tcPr>
+                </a:tc>
+                <a:tc>
+                  <a:txBody>
+                    <a:bodyPr/>
+                    <a:lstStyle/>
+                    <a:p>
+                      <a:pPr marL="0" marR="0" algn="ctr" fontAlgn="base">
+                        <a:lnSpc>
+                          <a:spcPct val="107000"/>
+                        </a:lnSpc>
+                        <a:spcBef>
+                          <a:spcPts val="0"/>
+                        </a:spcBef>
+                        <a:spcAft>
+                          <a:spcPts val="750"/>
+                        </a:spcAft>
+                      </a:pPr>
+                      <a:r>
+                        <a:rPr lang="en-US" sz="1250">
+                          <a:effectLst/>
+                          <a:latin typeface="Times New Roman" panose="02020603050405020304" pitchFamily="18" charset="0"/>
+                          <a:ea typeface="Times New Roman" panose="02020603050405020304" pitchFamily="18" charset="0"/>
+                          <a:cs typeface="Times New Roman" panose="02020603050405020304" pitchFamily="18" charset="0"/>
+                        </a:rPr>
+                        <a:t>O(n)</a:t>
+                      </a:r>
+                      <a:endParaRPr lang="en-US" sz="1100">
+                        <a:effectLst/>
+                        <a:latin typeface="Calibri" panose="020F0502020204030204" pitchFamily="34" charset="0"/>
+                        <a:ea typeface="Calibri" panose="020F0502020204030204" pitchFamily="34" charset="0"/>
+                        <a:cs typeface="Times New Roman" panose="02020603050405020304" pitchFamily="18" charset="0"/>
+                      </a:endParaRPr>
+                    </a:p>
+                  </a:txBody>
+                  <a:tcPr marL="95250" marR="95250" marT="133350" marB="133350" anchor="ctr">
+                    <a:lnL w="12700" cap="flat" cmpd="sng" algn="ctr">
+                      <a:solidFill>
+                        <a:srgbClr val="DFDFDF"/>
+                      </a:solidFill>
+                      <a:prstDash val="solid"/>
+                      <a:round/>
+                      <a:headEnd type="none" w="med" len="med"/>
+                      <a:tailEnd type="none" w="med" len="med"/>
+                    </a:lnL>
+                    <a:lnR w="12700" cap="flat" cmpd="sng" algn="ctr">
+                      <a:solidFill>
+                        <a:srgbClr val="DFDFDF"/>
+                      </a:solidFill>
+                      <a:prstDash val="solid"/>
+                      <a:round/>
+                      <a:headEnd type="none" w="med" len="med"/>
+                      <a:tailEnd type="none" w="med" len="med"/>
+                    </a:lnR>
+                    <a:lnT w="12700" cap="flat" cmpd="sng" algn="ctr">
+                      <a:solidFill>
+                        <a:srgbClr val="DFDFDF"/>
+                      </a:solidFill>
+                      <a:prstDash val="solid"/>
+                      <a:round/>
+                      <a:headEnd type="none" w="med" len="med"/>
+                      <a:tailEnd type="none" w="med" len="med"/>
+                    </a:lnT>
+                    <a:lnB w="12700" cap="flat" cmpd="sng" algn="ctr">
+                      <a:solidFill>
+                        <a:srgbClr val="DFDFDF"/>
+                      </a:solidFill>
+                      <a:prstDash val="solid"/>
+                      <a:round/>
+                      <a:headEnd type="none" w="med" len="med"/>
+                      <a:tailEnd type="none" w="med" len="med"/>
+                    </a:lnB>
+                  </a:tcPr>
+                </a:tc>
+                <a:extLst>
+                  <a:ext uri="{0D108BD9-81ED-4DB2-BD59-A6C34878D82A}">
+                    <a16:rowId xmlns:a16="http://schemas.microsoft.com/office/drawing/2014/main" val="3614751563"/>
+                  </a:ext>
+                </a:extLst>
+              </a:tr>
+              <a:tr h="0">
+                <a:tc>
+                  <a:txBody>
+                    <a:bodyPr/>
+                    <a:lstStyle/>
+                    <a:p>
+                      <a:pPr marL="0" marR="0" algn="ctr" fontAlgn="base">
+                        <a:lnSpc>
+                          <a:spcPct val="107000"/>
+                        </a:lnSpc>
+                        <a:spcBef>
+                          <a:spcPts val="0"/>
+                        </a:spcBef>
+                        <a:spcAft>
+                          <a:spcPts val="750"/>
+                        </a:spcAft>
+                      </a:pPr>
+                      <a:r>
+                        <a:rPr lang="en-US" sz="1300" b="1">
+                          <a:effectLst/>
+                          <a:latin typeface="Times New Roman" panose="02020603050405020304" pitchFamily="18" charset="0"/>
+                          <a:ea typeface="Times New Roman" panose="02020603050405020304" pitchFamily="18" charset="0"/>
+                          <a:cs typeface="Times New Roman" panose="02020603050405020304" pitchFamily="18" charset="0"/>
+                        </a:rPr>
+                        <a:t>Stable</a:t>
+                      </a:r>
+                      <a:endParaRPr lang="en-US" sz="1100">
+                        <a:effectLst/>
+                        <a:latin typeface="Calibri" panose="020F0502020204030204" pitchFamily="34" charset="0"/>
+                        <a:ea typeface="Calibri" panose="020F0502020204030204" pitchFamily="34" charset="0"/>
+                        <a:cs typeface="Times New Roman" panose="02020603050405020304" pitchFamily="18" charset="0"/>
+                      </a:endParaRPr>
+                    </a:p>
+                  </a:txBody>
+                  <a:tcPr marL="38100" marR="38100" marT="36195" marB="36195" anchor="b">
+                    <a:lnL w="12700" cap="flat" cmpd="sng" algn="ctr">
+                      <a:solidFill>
+                        <a:srgbClr val="DFDFDF"/>
+                      </a:solidFill>
+                      <a:prstDash val="solid"/>
+                      <a:round/>
+                      <a:headEnd type="none" w="med" len="med"/>
+                      <a:tailEnd type="none" w="med" len="med"/>
+                    </a:lnL>
+                    <a:lnR w="12700" cap="flat" cmpd="sng" algn="ctr">
+                      <a:solidFill>
+                        <a:srgbClr val="DFDFDF"/>
+                      </a:solidFill>
+                      <a:prstDash val="solid"/>
+                      <a:round/>
+                      <a:headEnd type="none" w="med" len="med"/>
+                      <a:tailEnd type="none" w="med" len="med"/>
+                    </a:lnR>
+                    <a:lnT w="12700" cap="flat" cmpd="sng" algn="ctr">
+                      <a:solidFill>
+                        <a:srgbClr val="DFDFDF"/>
+                      </a:solidFill>
+                      <a:prstDash val="solid"/>
+                      <a:round/>
+                      <a:headEnd type="none" w="med" len="med"/>
+                      <a:tailEnd type="none" w="med" len="med"/>
+                    </a:lnT>
+                    <a:lnB w="12700" cap="flat" cmpd="sng" algn="ctr">
+                      <a:solidFill>
+                        <a:srgbClr val="DFDFDF"/>
+                      </a:solidFill>
+                      <a:prstDash val="solid"/>
+                      <a:round/>
+                      <a:headEnd type="none" w="med" len="med"/>
+                      <a:tailEnd type="none" w="med" len="med"/>
+                    </a:lnB>
+                  </a:tcPr>
+                </a:tc>
+                <a:tc>
+                  <a:txBody>
+                    <a:bodyPr/>
+                    <a:lstStyle/>
+                    <a:p>
+                      <a:pPr marL="0" marR="0" algn="ctr" fontAlgn="base">
+                        <a:lnSpc>
+                          <a:spcPct val="107000"/>
+                        </a:lnSpc>
+                        <a:spcBef>
+                          <a:spcPts val="0"/>
+                        </a:spcBef>
+                        <a:spcAft>
+                          <a:spcPts val="750"/>
+                        </a:spcAft>
+                      </a:pPr>
+                      <a:r>
+                        <a:rPr lang="en-US" sz="1250">
+                          <a:effectLst/>
+                          <a:latin typeface="Times New Roman" panose="02020603050405020304" pitchFamily="18" charset="0"/>
+                          <a:ea typeface="Times New Roman" panose="02020603050405020304" pitchFamily="18" charset="0"/>
+                          <a:cs typeface="Times New Roman" panose="02020603050405020304" pitchFamily="18" charset="0"/>
+                        </a:rPr>
+                        <a:t>YES</a:t>
+                      </a:r>
+                      <a:endParaRPr lang="en-US" sz="1100">
+                        <a:effectLst/>
+                        <a:latin typeface="Calibri" panose="020F0502020204030204" pitchFamily="34" charset="0"/>
+                        <a:ea typeface="Calibri" panose="020F0502020204030204" pitchFamily="34" charset="0"/>
+                        <a:cs typeface="Times New Roman" panose="02020603050405020304" pitchFamily="18" charset="0"/>
+                      </a:endParaRPr>
+                    </a:p>
+                  </a:txBody>
+                  <a:tcPr marL="95250" marR="95250" marT="133350" marB="133350" anchor="ctr">
+                    <a:lnL w="12700" cap="flat" cmpd="sng" algn="ctr">
+                      <a:solidFill>
+                        <a:srgbClr val="DFDFDF"/>
+                      </a:solidFill>
+                      <a:prstDash val="solid"/>
+                      <a:round/>
+                      <a:headEnd type="none" w="med" len="med"/>
+                      <a:tailEnd type="none" w="med" len="med"/>
+                    </a:lnL>
+                    <a:lnR w="12700" cap="flat" cmpd="sng" algn="ctr">
+                      <a:solidFill>
+                        <a:srgbClr val="DFDFDF"/>
+                      </a:solidFill>
+                      <a:prstDash val="solid"/>
+                      <a:round/>
+                      <a:headEnd type="none" w="med" len="med"/>
+                      <a:tailEnd type="none" w="med" len="med"/>
+                    </a:lnR>
+                    <a:lnT w="12700" cap="flat" cmpd="sng" algn="ctr">
+                      <a:solidFill>
+                        <a:srgbClr val="DFDFDF"/>
+                      </a:solidFill>
+                      <a:prstDash val="solid"/>
+                      <a:round/>
+                      <a:headEnd type="none" w="med" len="med"/>
+                      <a:tailEnd type="none" w="med" len="med"/>
+                    </a:lnT>
+                    <a:lnB w="12700" cap="flat" cmpd="sng" algn="ctr">
+                      <a:solidFill>
+                        <a:srgbClr val="DFDFDF"/>
+                      </a:solidFill>
+                      <a:prstDash val="solid"/>
+                      <a:round/>
+                      <a:headEnd type="none" w="med" len="med"/>
+                      <a:tailEnd type="none" w="med" len="med"/>
+                    </a:lnB>
+                  </a:tcPr>
+                </a:tc>
+                <a:extLst>
+                  <a:ext uri="{0D108BD9-81ED-4DB2-BD59-A6C34878D82A}">
+                    <a16:rowId xmlns:a16="http://schemas.microsoft.com/office/drawing/2014/main" val="233834051"/>
+                  </a:ext>
+                </a:extLst>
+              </a:tr>
+              <a:tr h="0">
+                <a:tc>
+                  <a:txBody>
+                    <a:bodyPr/>
+                    <a:lstStyle/>
+                    <a:p>
+                      <a:pPr marL="0" marR="0" algn="ctr">
+                        <a:lnSpc>
+                          <a:spcPct val="107000"/>
+                        </a:lnSpc>
+                        <a:spcBef>
+                          <a:spcPts val="0"/>
+                        </a:spcBef>
+                        <a:spcAft>
+                          <a:spcPts val="0"/>
+                        </a:spcAft>
+                      </a:pPr>
+                      <a:r>
+                        <a:rPr lang="en-US" sz="1300" b="1">
+                          <a:effectLst/>
+                          <a:latin typeface="Times New Roman" panose="02020603050405020304" pitchFamily="18" charset="0"/>
+                          <a:ea typeface="Times New Roman" panose="02020603050405020304" pitchFamily="18" charset="0"/>
+                          <a:cs typeface="Times New Roman" panose="02020603050405020304" pitchFamily="18" charset="0"/>
+                        </a:rPr>
+                        <a:t>In-Place Sorting</a:t>
+                      </a:r>
+                      <a:endParaRPr lang="en-US" sz="1100">
+                        <a:effectLst/>
+                        <a:latin typeface="Calibri" panose="020F0502020204030204" pitchFamily="34" charset="0"/>
+                        <a:ea typeface="Calibri" panose="020F0502020204030204" pitchFamily="34" charset="0"/>
+                        <a:cs typeface="Times New Roman" panose="02020603050405020304" pitchFamily="18" charset="0"/>
+                      </a:endParaRPr>
+                    </a:p>
+                  </a:txBody>
+                  <a:tcPr marL="38100" marR="38100" marT="36195" marB="36195" anchor="b">
+                    <a:lnL w="12700" cap="flat" cmpd="sng" algn="ctr">
+                      <a:solidFill>
+                        <a:srgbClr val="DFDFDF"/>
+                      </a:solidFill>
+                      <a:prstDash val="solid"/>
+                      <a:round/>
+                      <a:headEnd type="none" w="med" len="med"/>
+                      <a:tailEnd type="none" w="med" len="med"/>
+                    </a:lnL>
+                    <a:lnR w="12700" cap="flat" cmpd="sng" algn="ctr">
+                      <a:solidFill>
+                        <a:srgbClr val="DFDFDF"/>
+                      </a:solidFill>
+                      <a:prstDash val="solid"/>
+                      <a:round/>
+                      <a:headEnd type="none" w="med" len="med"/>
+                      <a:tailEnd type="none" w="med" len="med"/>
+                    </a:lnR>
+                    <a:lnT w="12700" cap="flat" cmpd="sng" algn="ctr">
+                      <a:solidFill>
+                        <a:srgbClr val="DFDFDF"/>
+                      </a:solidFill>
+                      <a:prstDash val="solid"/>
+                      <a:round/>
+                      <a:headEnd type="none" w="med" len="med"/>
+                      <a:tailEnd type="none" w="med" len="med"/>
+                    </a:lnT>
+                    <a:lnB w="12700" cap="flat" cmpd="sng" algn="ctr">
+                      <a:solidFill>
+                        <a:srgbClr val="DFDFDF"/>
+                      </a:solidFill>
+                      <a:prstDash val="solid"/>
+                      <a:round/>
+                      <a:headEnd type="none" w="med" len="med"/>
+                      <a:tailEnd type="none" w="med" len="med"/>
+                    </a:lnB>
+                  </a:tcPr>
+                </a:tc>
+                <a:tc>
+                  <a:txBody>
+                    <a:bodyPr/>
+                    <a:lstStyle/>
+                    <a:p>
+                      <a:pPr marL="0" marR="0" algn="ctr">
+                        <a:lnSpc>
+                          <a:spcPct val="107000"/>
+                        </a:lnSpc>
+                        <a:spcBef>
+                          <a:spcPts val="0"/>
+                        </a:spcBef>
+                        <a:spcAft>
+                          <a:spcPts val="0"/>
+                        </a:spcAft>
+                      </a:pPr>
+                      <a:r>
+                        <a:rPr lang="en-US" sz="1250" dirty="0">
+                          <a:effectLst/>
+                          <a:latin typeface="Times New Roman" panose="02020603050405020304" pitchFamily="18" charset="0"/>
+                          <a:ea typeface="Times New Roman" panose="02020603050405020304" pitchFamily="18" charset="0"/>
+                          <a:cs typeface="Times New Roman" panose="02020603050405020304" pitchFamily="18" charset="0"/>
+                        </a:rPr>
+                        <a:t>NO, as it requires extra space</a:t>
+                      </a:r>
+                      <a:endParaRPr lang="en-US" sz="1100" dirty="0">
+                        <a:effectLst/>
+                        <a:latin typeface="Calibri" panose="020F0502020204030204" pitchFamily="34" charset="0"/>
+                        <a:ea typeface="Calibri" panose="020F0502020204030204" pitchFamily="34" charset="0"/>
+                        <a:cs typeface="Times New Roman" panose="02020603050405020304" pitchFamily="18" charset="0"/>
+                      </a:endParaRPr>
+                    </a:p>
+                  </a:txBody>
+                  <a:tcPr marL="95250" marR="95250" marT="133350" marB="133350" anchor="ctr">
+                    <a:lnL w="12700" cap="flat" cmpd="sng" algn="ctr">
+                      <a:solidFill>
+                        <a:srgbClr val="DFDFDF"/>
+                      </a:solidFill>
+                      <a:prstDash val="solid"/>
+                      <a:round/>
+                      <a:headEnd type="none" w="med" len="med"/>
+                      <a:tailEnd type="none" w="med" len="med"/>
+                    </a:lnL>
+                    <a:lnR w="12700" cap="flat" cmpd="sng" algn="ctr">
+                      <a:solidFill>
+                        <a:srgbClr val="DFDFDF"/>
+                      </a:solidFill>
+                      <a:prstDash val="solid"/>
+                      <a:round/>
+                      <a:headEnd type="none" w="med" len="med"/>
+                      <a:tailEnd type="none" w="med" len="med"/>
+                    </a:lnR>
+                    <a:lnT w="12700" cap="flat" cmpd="sng" algn="ctr">
+                      <a:solidFill>
+                        <a:srgbClr val="DFDFDF"/>
+                      </a:solidFill>
+                      <a:prstDash val="solid"/>
+                      <a:round/>
+                      <a:headEnd type="none" w="med" len="med"/>
+                      <a:tailEnd type="none" w="med" len="med"/>
+                    </a:lnT>
+                    <a:lnB w="12700" cap="flat" cmpd="sng" algn="ctr">
+                      <a:solidFill>
+                        <a:srgbClr val="DFDFDF"/>
+                      </a:solidFill>
+                      <a:prstDash val="solid"/>
+                      <a:round/>
+                      <a:headEnd type="none" w="med" len="med"/>
+                      <a:tailEnd type="none" w="med" len="med"/>
+                    </a:lnB>
+                  </a:tcPr>
+                </a:tc>
+                <a:extLst>
+                  <a:ext uri="{0D108BD9-81ED-4DB2-BD59-A6C34878D82A}">
+                    <a16:rowId xmlns:a16="http://schemas.microsoft.com/office/drawing/2014/main" val="2861453569"/>
+                  </a:ext>
+                </a:extLst>
+              </a:tr>
+            </a:tbl>
+          </a:graphicData>
+        </a:graphic>
+      </p:graphicFrame>
+      <p:sp>
+        <p:nvSpPr>
+          <p:cNvPr id="3" name="Rectangle 1">
+            <a:extLst>
+              <a:ext uri="{FF2B5EF4-FFF2-40B4-BE49-F238E27FC236}">
+                <a16:creationId xmlns:a16="http://schemas.microsoft.com/office/drawing/2014/main" id="{B0116DF8-3469-48A0-8412-DE94E3B5F215}"/>
+              </a:ext>
+            </a:extLst>
+          </p:cNvPr>
+          <p:cNvSpPr>
+            <a:spLocks noChangeArrowheads="1"/>
+          </p:cNvSpPr>
+          <p:nvPr/>
+        </p:nvSpPr>
+        <p:spPr bwMode="auto">
+          <a:xfrm>
+            <a:off x="0" y="0"/>
+            <a:ext cx="12192000" cy="457200"/>
+          </a:xfrm>
+          <a:prstGeom prst="rect">
+            <a:avLst/>
+          </a:prstGeom>
+          <a:noFill/>
+          <a:ln>
+            <a:noFill/>
+          </a:ln>
+          <a:effectLst/>
+          <a:extLst>
+            <a:ext uri="{909E8E84-426E-40DD-AFC4-6F175D3DCCD1}">
+              <a14:hiddenFill xmlns:a14="http://schemas.microsoft.com/office/drawing/2010/main">
+                <a:solidFill>
+                  <a:schemeClr val="accent1"/>
+                </a:solidFill>
+              </a14:hiddenFill>
+            </a:ext>
+            <a:ext uri="{91240B29-F687-4F45-9708-019B960494DF}">
+              <a14:hiddenLine xmlns:a14="http://schemas.microsoft.com/office/drawing/2010/main" w="9525">
+                <a:solidFill>
+                  <a:schemeClr val="tx1"/>
+                </a:solidFill>
+                <a:miter lim="800000"/>
+                <a:headEnd/>
+                <a:tailEnd/>
+              </a14:hiddenLine>
+            </a:ext>
+            <a:ext uri="{AF507438-7753-43E0-B8FC-AC1667EBCBE1}">
+              <a14:hiddenEffects xmlns:a14="http://schemas.microsoft.com/office/drawing/2010/main">
+                <a:effectLst>
+                  <a:outerShdw dist="35921" dir="2700000" algn="ctr" rotWithShape="0">
+                    <a:schemeClr val="bg2"/>
+                  </a:outerShdw>
+                </a:effectLst>
+              </a14:hiddenEffects>
+            </a:ext>
+          </a:extLst>
+        </p:spPr>
+        <p:txBody>
+          <a:bodyPr vert="horz" wrap="none" lIns="91440" tIns="45720" rIns="91440" bIns="45720" numCol="1" anchor="ctr" anchorCtr="0" compatLnSpc="1">
+            <a:prstTxWarp prst="textNoShape">
+              <a:avLst/>
+            </a:prstTxWarp>
+            <a:spAutoFit/>
+          </a:bodyPr>
           <a:lstStyle/>
           <a:p>
-            <a:endParaRPr lang="en-US"/>
+            <a:pPr marL="0" marR="0" lvl="0" indent="0" algn="l" defTabSz="914400" rtl="0" eaLnBrk="0" fontAlgn="base" latinLnBrk="0" hangingPunct="0">
+              <a:lnSpc>
+                <a:spcPct val="100000"/>
+              </a:lnSpc>
+              <a:spcBef>
+                <a:spcPct val="0"/>
+              </a:spcBef>
+              <a:spcAft>
+                <a:spcPct val="0"/>
+              </a:spcAft>
+              <a:buClrTx/>
+              <a:buSzTx/>
+              <a:buFontTx/>
+              <a:buNone/>
+              <a:tabLst/>
+            </a:pPr>
+            <a:r>
+              <a:rPr kumimoji="0" lang="en-US" altLang="en-US" sz="1300" b="1" i="0" u="none" strike="noStrike" cap="none" normalizeH="0" baseline="0">
+                <a:ln>
+                  <a:noFill/>
+                </a:ln>
+                <a:solidFill>
+                  <a:srgbClr val="273239"/>
+                </a:solidFill>
+                <a:effectLst/>
+                <a:latin typeface="Arial" panose="020B0604020202020204" pitchFamily="34" charset="0"/>
+                <a:ea typeface="Times New Roman" panose="02020603050405020304" pitchFamily="18" charset="0"/>
+                <a:cs typeface="Arial" panose="020B0604020202020204" pitchFamily="34" charset="0"/>
+              </a:rPr>
+              <a:t>Complexity Analysis</a:t>
+            </a:r>
+            <a:r>
+              <a:rPr kumimoji="0" lang="en-US" altLang="en-US" sz="1300" b="0" i="0" u="none" strike="noStrike" cap="none" normalizeH="0" baseline="0">
+                <a:ln>
+                  <a:noFill/>
+                </a:ln>
+                <a:solidFill>
+                  <a:srgbClr val="273239"/>
+                </a:solidFill>
+                <a:effectLst/>
+                <a:latin typeface="Arial" panose="020B0604020202020204" pitchFamily="34" charset="0"/>
+                <a:ea typeface="Times New Roman" panose="02020603050405020304" pitchFamily="18" charset="0"/>
+                <a:cs typeface="Arial" panose="020B0604020202020204" pitchFamily="34" charset="0"/>
+              </a:rPr>
+              <a:t>:</a:t>
+            </a:r>
+            <a:endParaRPr kumimoji="0" lang="en-US" altLang="en-US" sz="1800" b="0" i="0" u="none" strike="noStrike" cap="none" normalizeH="0" baseline="0">
+              <a:ln>
+                <a:noFill/>
+              </a:ln>
+              <a:solidFill>
+                <a:schemeClr val="tx1"/>
+              </a:solidFill>
+              <a:effectLst/>
+              <a:latin typeface="Arial" panose="020B0604020202020204" pitchFamily="34" charset="0"/>
+            </a:endParaRPr>
           </a:p>
         </p:txBody>
       </p:sp>
@@ -7648,20 +8855,20 @@
 </file>
 
 <file path=customXml/item2.xml><?xml version="1.0" encoding="utf-8"?>
-<p:properties xmlns:p="http://schemas.microsoft.com/office/2006/metadata/properties" xmlns:xsi="http://www.w3.org/2001/XMLSchema-instance" xmlns:pc="http://schemas.microsoft.com/office/infopath/2007/PartnerControls">
-  <documentManagement>
-    <_activity xmlns="bdaba121-48a8-493b-9567-a1d720e935a1" xsi:nil="true"/>
-  </documentManagement>
-</p:properties>
-</file>
-
-<file path=customXml/item3.xml><?xml version="1.0" encoding="utf-8"?>
 <?mso-contentType ?>
 <FormTemplates xmlns="http://schemas.microsoft.com/sharepoint/v3/contenttype/forms">
   <Display>DocumentLibraryForm</Display>
   <Edit>DocumentLibraryForm</Edit>
   <New>DocumentLibraryForm</New>
 </FormTemplates>
+</file>
+
+<file path=customXml/item3.xml><?xml version="1.0" encoding="utf-8"?>
+<p:properties xmlns:p="http://schemas.microsoft.com/office/2006/metadata/properties" xmlns:xsi="http://www.w3.org/2001/XMLSchema-instance" xmlns:pc="http://schemas.microsoft.com/office/infopath/2007/PartnerControls">
+  <documentManagement>
+    <_activity xmlns="bdaba121-48a8-493b-9567-a1d720e935a1" xsi:nil="true"/>
+  </documentManagement>
+</p:properties>
 </file>
 
 <file path=customXml/itemProps1.xml><?xml version="1.0" encoding="utf-8"?>
@@ -7684,6 +8891,14 @@
 </file>
 
 <file path=customXml/itemProps2.xml><?xml version="1.0" encoding="utf-8"?>
+<ds:datastoreItem xmlns:ds="http://schemas.openxmlformats.org/officeDocument/2006/customXml" ds:itemID="{E133C991-2001-4127-8C22-801161A4C08A}">
+  <ds:schemaRefs>
+    <ds:schemaRef ds:uri="http://schemas.microsoft.com/sharepoint/v3/contenttype/forms"/>
+  </ds:schemaRefs>
+</ds:datastoreItem>
+</file>
+
+<file path=customXml/itemProps3.xml><?xml version="1.0" encoding="utf-8"?>
 <ds:datastoreItem xmlns:ds="http://schemas.openxmlformats.org/officeDocument/2006/customXml" ds:itemID="{5AFD10CD-42A2-464F-BCBC-377959371850}">
   <ds:schemaRefs>
     <ds:schemaRef ds:uri="http://purl.org/dc/dcmitype/"/>
@@ -7698,12 +8913,4 @@
     <ds:schemaRef ds:uri="http://schemas.microsoft.com/office/2006/metadata/properties"/>
   </ds:schemaRefs>
 </ds:datastoreItem>
-</file>
-
-<file path=customXml/itemProps3.xml><?xml version="1.0" encoding="utf-8"?>
-<ds:datastoreItem xmlns:ds="http://schemas.openxmlformats.org/officeDocument/2006/customXml" ds:itemID="{E133C991-2001-4127-8C22-801161A4C08A}">
-  <ds:schemaRefs>
-    <ds:schemaRef ds:uri="http://schemas.microsoft.com/sharepoint/v3/contenttype/forms"/>
-  </ds:schemaRefs>
-</ds:datastoreItem>
 </file>
</xml_diff>